<commit_message>
Update for HDC Workshops
</commit_message>
<xml_diff>
--- a/Getting to Know ASP.pptx
+++ b/Getting to Know ASP.pptx
@@ -4,18 +4,24 @@
   <p:sldMasterIdLst>
     <p:sldMasterId id="2147483648" r:id="rId1"/>
   </p:sldMasterIdLst>
+  <p:notesMasterIdLst>
+    <p:notesMasterId r:id="rId16"/>
+  </p:notesMasterIdLst>
   <p:sldIdLst>
     <p:sldId id="256" r:id="rId2"/>
     <p:sldId id="257" r:id="rId3"/>
-    <p:sldId id="258" r:id="rId4"/>
-    <p:sldId id="259" r:id="rId5"/>
-    <p:sldId id="260" r:id="rId6"/>
-    <p:sldId id="261" r:id="rId7"/>
-    <p:sldId id="262" r:id="rId8"/>
-    <p:sldId id="263" r:id="rId9"/>
-    <p:sldId id="265" r:id="rId10"/>
-    <p:sldId id="264" r:id="rId11"/>
-    <p:sldId id="266" r:id="rId12"/>
+    <p:sldId id="267" r:id="rId4"/>
+    <p:sldId id="258" r:id="rId5"/>
+    <p:sldId id="259" r:id="rId6"/>
+    <p:sldId id="260" r:id="rId7"/>
+    <p:sldId id="261" r:id="rId8"/>
+    <p:sldId id="262" r:id="rId9"/>
+    <p:sldId id="263" r:id="rId10"/>
+    <p:sldId id="265" r:id="rId11"/>
+    <p:sldId id="268" r:id="rId12"/>
+    <p:sldId id="264" r:id="rId13"/>
+    <p:sldId id="269" r:id="rId14"/>
+    <p:sldId id="266" r:id="rId15"/>
   </p:sldIdLst>
   <p:sldSz cx="12192000" cy="6858000"/>
   <p:notesSz cx="6858000" cy="9144000"/>
@@ -120,6 +126,1600 @@
     </p:ext>
   </p:extLst>
 </p:presentation>
+</file>
+
+<file path=ppt/notesMasters/notesMaster1.xml><?xml version="1.0" encoding="utf-8"?>
+<p:notesMaster xmlns:a="http://schemas.openxmlformats.org/drawingml/2006/main" xmlns:r="http://schemas.openxmlformats.org/officeDocument/2006/relationships" xmlns:p="http://schemas.openxmlformats.org/presentationml/2006/main">
+  <p:cSld>
+    <p:bg>
+      <p:bgRef idx="1001">
+        <a:schemeClr val="bg1"/>
+      </p:bgRef>
+    </p:bg>
+    <p:spTree>
+      <p:nvGrpSpPr>
+        <p:cNvPr id="1" name=""/>
+        <p:cNvGrpSpPr/>
+        <p:nvPr/>
+      </p:nvGrpSpPr>
+      <p:grpSpPr>
+        <a:xfrm>
+          <a:off x="0" y="0"/>
+          <a:ext cx="0" cy="0"/>
+          <a:chOff x="0" y="0"/>
+          <a:chExt cx="0" cy="0"/>
+        </a:xfrm>
+      </p:grpSpPr>
+      <p:sp>
+        <p:nvSpPr>
+          <p:cNvPr id="2" name="Header Placeholder 1"/>
+          <p:cNvSpPr>
+            <a:spLocks noGrp="1"/>
+          </p:cNvSpPr>
+          <p:nvPr>
+            <p:ph type="hdr" sz="quarter"/>
+          </p:nvPr>
+        </p:nvSpPr>
+        <p:spPr>
+          <a:xfrm>
+            <a:off x="0" y="0"/>
+            <a:ext cx="2971800" cy="458788"/>
+          </a:xfrm>
+          <a:prstGeom prst="rect">
+            <a:avLst/>
+          </a:prstGeom>
+        </p:spPr>
+        <p:txBody>
+          <a:bodyPr vert="horz" lIns="91440" tIns="45720" rIns="91440" bIns="45720" rtlCol="0"/>
+          <a:lstStyle>
+            <a:lvl1pPr algn="l">
+              <a:defRPr sz="1200"/>
+            </a:lvl1pPr>
+          </a:lstStyle>
+          <a:p>
+            <a:endParaRPr lang="en-US"/>
+          </a:p>
+        </p:txBody>
+      </p:sp>
+      <p:sp>
+        <p:nvSpPr>
+          <p:cNvPr id="3" name="Date Placeholder 2"/>
+          <p:cNvSpPr>
+            <a:spLocks noGrp="1"/>
+          </p:cNvSpPr>
+          <p:nvPr>
+            <p:ph type="dt" idx="1"/>
+          </p:nvPr>
+        </p:nvSpPr>
+        <p:spPr>
+          <a:xfrm>
+            <a:off x="3884613" y="0"/>
+            <a:ext cx="2971800" cy="458788"/>
+          </a:xfrm>
+          <a:prstGeom prst="rect">
+            <a:avLst/>
+          </a:prstGeom>
+        </p:spPr>
+        <p:txBody>
+          <a:bodyPr vert="horz" lIns="91440" tIns="45720" rIns="91440" bIns="45720" rtlCol="0"/>
+          <a:lstStyle>
+            <a:lvl1pPr algn="r">
+              <a:defRPr sz="1200"/>
+            </a:lvl1pPr>
+          </a:lstStyle>
+          <a:p>
+            <a:fld id="{D379596F-63F0-44AB-B0BA-0397E03F12FE}" type="datetimeFigureOut">
+              <a:rPr lang="en-US" smtClean="0"/>
+              <a:t>9/2/2014</a:t>
+            </a:fld>
+            <a:endParaRPr lang="en-US"/>
+          </a:p>
+        </p:txBody>
+      </p:sp>
+      <p:sp>
+        <p:nvSpPr>
+          <p:cNvPr id="4" name="Slide Image Placeholder 3"/>
+          <p:cNvSpPr>
+            <a:spLocks noGrp="1" noRot="1" noChangeAspect="1"/>
+          </p:cNvSpPr>
+          <p:nvPr>
+            <p:ph type="sldImg" idx="2"/>
+          </p:nvPr>
+        </p:nvSpPr>
+        <p:spPr>
+          <a:xfrm>
+            <a:off x="685800" y="1143000"/>
+            <a:ext cx="5486400" cy="3086100"/>
+          </a:xfrm>
+          <a:prstGeom prst="rect">
+            <a:avLst/>
+          </a:prstGeom>
+          <a:noFill/>
+          <a:ln w="12700">
+            <a:solidFill>
+              <a:prstClr val="black"/>
+            </a:solidFill>
+          </a:ln>
+        </p:spPr>
+        <p:txBody>
+          <a:bodyPr vert="horz" lIns="91440" tIns="45720" rIns="91440" bIns="45720" rtlCol="0" anchor="ctr"/>
+          <a:lstStyle/>
+          <a:p>
+            <a:endParaRPr lang="en-US"/>
+          </a:p>
+        </p:txBody>
+      </p:sp>
+      <p:sp>
+        <p:nvSpPr>
+          <p:cNvPr id="5" name="Notes Placeholder 4"/>
+          <p:cNvSpPr>
+            <a:spLocks noGrp="1"/>
+          </p:cNvSpPr>
+          <p:nvPr>
+            <p:ph type="body" sz="quarter" idx="3"/>
+          </p:nvPr>
+        </p:nvSpPr>
+        <p:spPr>
+          <a:xfrm>
+            <a:off x="685800" y="4400550"/>
+            <a:ext cx="5486400" cy="3600450"/>
+          </a:xfrm>
+          <a:prstGeom prst="rect">
+            <a:avLst/>
+          </a:prstGeom>
+        </p:spPr>
+        <p:txBody>
+          <a:bodyPr vert="horz" lIns="91440" tIns="45720" rIns="91440" bIns="45720" rtlCol="0"/>
+          <a:lstStyle/>
+          <a:p>
+            <a:pPr lvl="0"/>
+            <a:r>
+              <a:rPr lang="en-US" smtClean="0"/>
+              <a:t>Click to edit Master text styles</a:t>
+            </a:r>
+          </a:p>
+          <a:p>
+            <a:pPr lvl="1"/>
+            <a:r>
+              <a:rPr lang="en-US" smtClean="0"/>
+              <a:t>Second level</a:t>
+            </a:r>
+          </a:p>
+          <a:p>
+            <a:pPr lvl="2"/>
+            <a:r>
+              <a:rPr lang="en-US" smtClean="0"/>
+              <a:t>Third level</a:t>
+            </a:r>
+          </a:p>
+          <a:p>
+            <a:pPr lvl="3"/>
+            <a:r>
+              <a:rPr lang="en-US" smtClean="0"/>
+              <a:t>Fourth level</a:t>
+            </a:r>
+          </a:p>
+          <a:p>
+            <a:pPr lvl="4"/>
+            <a:r>
+              <a:rPr lang="en-US" smtClean="0"/>
+              <a:t>Fifth level</a:t>
+            </a:r>
+            <a:endParaRPr lang="en-US"/>
+          </a:p>
+        </p:txBody>
+      </p:sp>
+      <p:sp>
+        <p:nvSpPr>
+          <p:cNvPr id="6" name="Footer Placeholder 5"/>
+          <p:cNvSpPr>
+            <a:spLocks noGrp="1"/>
+          </p:cNvSpPr>
+          <p:nvPr>
+            <p:ph type="ftr" sz="quarter" idx="4"/>
+          </p:nvPr>
+        </p:nvSpPr>
+        <p:spPr>
+          <a:xfrm>
+            <a:off x="0" y="8685213"/>
+            <a:ext cx="2971800" cy="458787"/>
+          </a:xfrm>
+          <a:prstGeom prst="rect">
+            <a:avLst/>
+          </a:prstGeom>
+        </p:spPr>
+        <p:txBody>
+          <a:bodyPr vert="horz" lIns="91440" tIns="45720" rIns="91440" bIns="45720" rtlCol="0" anchor="b"/>
+          <a:lstStyle>
+            <a:lvl1pPr algn="l">
+              <a:defRPr sz="1200"/>
+            </a:lvl1pPr>
+          </a:lstStyle>
+          <a:p>
+            <a:endParaRPr lang="en-US"/>
+          </a:p>
+        </p:txBody>
+      </p:sp>
+      <p:sp>
+        <p:nvSpPr>
+          <p:cNvPr id="7" name="Slide Number Placeholder 6"/>
+          <p:cNvSpPr>
+            <a:spLocks noGrp="1"/>
+          </p:cNvSpPr>
+          <p:nvPr>
+            <p:ph type="sldNum" sz="quarter" idx="5"/>
+          </p:nvPr>
+        </p:nvSpPr>
+        <p:spPr>
+          <a:xfrm>
+            <a:off x="3884613" y="8685213"/>
+            <a:ext cx="2971800" cy="458787"/>
+          </a:xfrm>
+          <a:prstGeom prst="rect">
+            <a:avLst/>
+          </a:prstGeom>
+        </p:spPr>
+        <p:txBody>
+          <a:bodyPr vert="horz" lIns="91440" tIns="45720" rIns="91440" bIns="45720" rtlCol="0" anchor="b"/>
+          <a:lstStyle>
+            <a:lvl1pPr algn="r">
+              <a:defRPr sz="1200"/>
+            </a:lvl1pPr>
+          </a:lstStyle>
+          <a:p>
+            <a:fld id="{0A74898D-8018-420B-8093-0FC091B04356}" type="slidenum">
+              <a:rPr lang="en-US" smtClean="0"/>
+              <a:t>‹#›</a:t>
+            </a:fld>
+            <a:endParaRPr lang="en-US"/>
+          </a:p>
+        </p:txBody>
+      </p:sp>
+    </p:spTree>
+    <p:extLst>
+      <p:ext uri="{BB962C8B-B14F-4D97-AF65-F5344CB8AC3E}">
+        <p14:creationId xmlns:p14="http://schemas.microsoft.com/office/powerpoint/2010/main" val="3263879007"/>
+      </p:ext>
+    </p:extLst>
+  </p:cSld>
+  <p:clrMap bg1="lt1" tx1="dk1" bg2="lt2" tx2="dk2" accent1="accent1" accent2="accent2" accent3="accent3" accent4="accent4" accent5="accent5" accent6="accent6" hlink="hlink" folHlink="folHlink"/>
+  <p:notesStyle>
+    <a:lvl1pPr marL="0" algn="l" defTabSz="914400" rtl="0" eaLnBrk="1" latinLnBrk="0" hangingPunct="1">
+      <a:defRPr sz="1200" kern="1200">
+        <a:solidFill>
+          <a:schemeClr val="tx1"/>
+        </a:solidFill>
+        <a:latin typeface="+mn-lt"/>
+        <a:ea typeface="+mn-ea"/>
+        <a:cs typeface="+mn-cs"/>
+      </a:defRPr>
+    </a:lvl1pPr>
+    <a:lvl2pPr marL="457200" algn="l" defTabSz="914400" rtl="0" eaLnBrk="1" latinLnBrk="0" hangingPunct="1">
+      <a:defRPr sz="1200" kern="1200">
+        <a:solidFill>
+          <a:schemeClr val="tx1"/>
+        </a:solidFill>
+        <a:latin typeface="+mn-lt"/>
+        <a:ea typeface="+mn-ea"/>
+        <a:cs typeface="+mn-cs"/>
+      </a:defRPr>
+    </a:lvl2pPr>
+    <a:lvl3pPr marL="914400" algn="l" defTabSz="914400" rtl="0" eaLnBrk="1" latinLnBrk="0" hangingPunct="1">
+      <a:defRPr sz="1200" kern="1200">
+        <a:solidFill>
+          <a:schemeClr val="tx1"/>
+        </a:solidFill>
+        <a:latin typeface="+mn-lt"/>
+        <a:ea typeface="+mn-ea"/>
+        <a:cs typeface="+mn-cs"/>
+      </a:defRPr>
+    </a:lvl3pPr>
+    <a:lvl4pPr marL="1371600" algn="l" defTabSz="914400" rtl="0" eaLnBrk="1" latinLnBrk="0" hangingPunct="1">
+      <a:defRPr sz="1200" kern="1200">
+        <a:solidFill>
+          <a:schemeClr val="tx1"/>
+        </a:solidFill>
+        <a:latin typeface="+mn-lt"/>
+        <a:ea typeface="+mn-ea"/>
+        <a:cs typeface="+mn-cs"/>
+      </a:defRPr>
+    </a:lvl4pPr>
+    <a:lvl5pPr marL="1828800" algn="l" defTabSz="914400" rtl="0" eaLnBrk="1" latinLnBrk="0" hangingPunct="1">
+      <a:defRPr sz="1200" kern="1200">
+        <a:solidFill>
+          <a:schemeClr val="tx1"/>
+        </a:solidFill>
+        <a:latin typeface="+mn-lt"/>
+        <a:ea typeface="+mn-ea"/>
+        <a:cs typeface="+mn-cs"/>
+      </a:defRPr>
+    </a:lvl5pPr>
+    <a:lvl6pPr marL="2286000" algn="l" defTabSz="914400" rtl="0" eaLnBrk="1" latinLnBrk="0" hangingPunct="1">
+      <a:defRPr sz="1200" kern="1200">
+        <a:solidFill>
+          <a:schemeClr val="tx1"/>
+        </a:solidFill>
+        <a:latin typeface="+mn-lt"/>
+        <a:ea typeface="+mn-ea"/>
+        <a:cs typeface="+mn-cs"/>
+      </a:defRPr>
+    </a:lvl6pPr>
+    <a:lvl7pPr marL="2743200" algn="l" defTabSz="914400" rtl="0" eaLnBrk="1" latinLnBrk="0" hangingPunct="1">
+      <a:defRPr sz="1200" kern="1200">
+        <a:solidFill>
+          <a:schemeClr val="tx1"/>
+        </a:solidFill>
+        <a:latin typeface="+mn-lt"/>
+        <a:ea typeface="+mn-ea"/>
+        <a:cs typeface="+mn-cs"/>
+      </a:defRPr>
+    </a:lvl7pPr>
+    <a:lvl8pPr marL="3200400" algn="l" defTabSz="914400" rtl="0" eaLnBrk="1" latinLnBrk="0" hangingPunct="1">
+      <a:defRPr sz="1200" kern="1200">
+        <a:solidFill>
+          <a:schemeClr val="tx1"/>
+        </a:solidFill>
+        <a:latin typeface="+mn-lt"/>
+        <a:ea typeface="+mn-ea"/>
+        <a:cs typeface="+mn-cs"/>
+      </a:defRPr>
+    </a:lvl8pPr>
+    <a:lvl9pPr marL="3657600" algn="l" defTabSz="914400" rtl="0" eaLnBrk="1" latinLnBrk="0" hangingPunct="1">
+      <a:defRPr sz="1200" kern="1200">
+        <a:solidFill>
+          <a:schemeClr val="tx1"/>
+        </a:solidFill>
+        <a:latin typeface="+mn-lt"/>
+        <a:ea typeface="+mn-ea"/>
+        <a:cs typeface="+mn-cs"/>
+      </a:defRPr>
+    </a:lvl9pPr>
+  </p:notesStyle>
+</p:notesMaster>
+</file>
+
+<file path=ppt/notesSlides/notesSlide1.xml><?xml version="1.0" encoding="utf-8"?>
+<p:notes xmlns:a="http://schemas.openxmlformats.org/drawingml/2006/main" xmlns:r="http://schemas.openxmlformats.org/officeDocument/2006/relationships" xmlns:p="http://schemas.openxmlformats.org/presentationml/2006/main">
+  <p:cSld>
+    <p:spTree>
+      <p:nvGrpSpPr>
+        <p:cNvPr id="1" name=""/>
+        <p:cNvGrpSpPr/>
+        <p:nvPr/>
+      </p:nvGrpSpPr>
+      <p:grpSpPr>
+        <a:xfrm>
+          <a:off x="0" y="0"/>
+          <a:ext cx="0" cy="0"/>
+          <a:chOff x="0" y="0"/>
+          <a:chExt cx="0" cy="0"/>
+        </a:xfrm>
+      </p:grpSpPr>
+      <p:sp>
+        <p:nvSpPr>
+          <p:cNvPr id="2" name="Slide Image Placeholder 1"/>
+          <p:cNvSpPr>
+            <a:spLocks noGrp="1" noRot="1" noChangeAspect="1"/>
+          </p:cNvSpPr>
+          <p:nvPr>
+            <p:ph type="sldImg"/>
+          </p:nvPr>
+        </p:nvSpPr>
+        <p:spPr/>
+      </p:sp>
+      <p:sp>
+        <p:nvSpPr>
+          <p:cNvPr id="3" name="Notes Placeholder 2"/>
+          <p:cNvSpPr>
+            <a:spLocks noGrp="1"/>
+          </p:cNvSpPr>
+          <p:nvPr>
+            <p:ph type="body" idx="1"/>
+          </p:nvPr>
+        </p:nvSpPr>
+        <p:spPr/>
+        <p:txBody>
+          <a:bodyPr/>
+          <a:lstStyle/>
+          <a:p>
+            <a:r>
+              <a:rPr lang="en-US" dirty="0" smtClean="0"/>
+              <a:t>Here are some notes.</a:t>
+            </a:r>
+          </a:p>
+        </p:txBody>
+      </p:sp>
+      <p:sp>
+        <p:nvSpPr>
+          <p:cNvPr id="4" name="Slide Number Placeholder 3"/>
+          <p:cNvSpPr>
+            <a:spLocks noGrp="1"/>
+          </p:cNvSpPr>
+          <p:nvPr>
+            <p:ph type="sldNum" sz="quarter" idx="10"/>
+          </p:nvPr>
+        </p:nvSpPr>
+        <p:spPr/>
+        <p:txBody>
+          <a:bodyPr/>
+          <a:lstStyle/>
+          <a:p>
+            <a:fld id="{0A74898D-8018-420B-8093-0FC091B04356}" type="slidenum">
+              <a:rPr lang="en-US" smtClean="0"/>
+              <a:t>1</a:t>
+            </a:fld>
+            <a:endParaRPr lang="en-US"/>
+          </a:p>
+        </p:txBody>
+      </p:sp>
+    </p:spTree>
+    <p:extLst>
+      <p:ext uri="{BB962C8B-B14F-4D97-AF65-F5344CB8AC3E}">
+        <p14:creationId xmlns:p14="http://schemas.microsoft.com/office/powerpoint/2010/main" val="2760508269"/>
+      </p:ext>
+    </p:extLst>
+  </p:cSld>
+  <p:clrMapOvr>
+    <a:masterClrMapping/>
+  </p:clrMapOvr>
+</p:notes>
+</file>
+
+<file path=ppt/notesSlides/notesSlide10.xml><?xml version="1.0" encoding="utf-8"?>
+<p:notes xmlns:a="http://schemas.openxmlformats.org/drawingml/2006/main" xmlns:r="http://schemas.openxmlformats.org/officeDocument/2006/relationships" xmlns:p="http://schemas.openxmlformats.org/presentationml/2006/main">
+  <p:cSld>
+    <p:spTree>
+      <p:nvGrpSpPr>
+        <p:cNvPr id="1" name=""/>
+        <p:cNvGrpSpPr/>
+        <p:nvPr/>
+      </p:nvGrpSpPr>
+      <p:grpSpPr>
+        <a:xfrm>
+          <a:off x="0" y="0"/>
+          <a:ext cx="0" cy="0"/>
+          <a:chOff x="0" y="0"/>
+          <a:chExt cx="0" cy="0"/>
+        </a:xfrm>
+      </p:grpSpPr>
+      <p:sp>
+        <p:nvSpPr>
+          <p:cNvPr id="2" name="Slide Image Placeholder 1"/>
+          <p:cNvSpPr>
+            <a:spLocks noGrp="1" noRot="1" noChangeAspect="1"/>
+          </p:cNvSpPr>
+          <p:nvPr>
+            <p:ph type="sldImg"/>
+          </p:nvPr>
+        </p:nvSpPr>
+        <p:spPr/>
+      </p:sp>
+      <p:sp>
+        <p:nvSpPr>
+          <p:cNvPr id="3" name="Notes Placeholder 2"/>
+          <p:cNvSpPr>
+            <a:spLocks noGrp="1"/>
+          </p:cNvSpPr>
+          <p:nvPr>
+            <p:ph type="body" idx="1"/>
+          </p:nvPr>
+        </p:nvSpPr>
+        <p:spPr/>
+        <p:txBody>
+          <a:bodyPr/>
+          <a:lstStyle/>
+          <a:p>
+            <a:endParaRPr lang="en-US"/>
+          </a:p>
+        </p:txBody>
+      </p:sp>
+      <p:sp>
+        <p:nvSpPr>
+          <p:cNvPr id="4" name="Slide Number Placeholder 3"/>
+          <p:cNvSpPr>
+            <a:spLocks noGrp="1"/>
+          </p:cNvSpPr>
+          <p:nvPr>
+            <p:ph type="sldNum" sz="quarter" idx="10"/>
+          </p:nvPr>
+        </p:nvSpPr>
+        <p:spPr/>
+        <p:txBody>
+          <a:bodyPr/>
+          <a:lstStyle/>
+          <a:p>
+            <a:fld id="{0A74898D-8018-420B-8093-0FC091B04356}" type="slidenum">
+              <a:rPr lang="en-US" smtClean="0"/>
+              <a:t>10</a:t>
+            </a:fld>
+            <a:endParaRPr lang="en-US"/>
+          </a:p>
+        </p:txBody>
+      </p:sp>
+    </p:spTree>
+    <p:extLst>
+      <p:ext uri="{BB962C8B-B14F-4D97-AF65-F5344CB8AC3E}">
+        <p14:creationId xmlns:p14="http://schemas.microsoft.com/office/powerpoint/2010/main" val="3678864490"/>
+      </p:ext>
+    </p:extLst>
+  </p:cSld>
+  <p:clrMapOvr>
+    <a:masterClrMapping/>
+  </p:clrMapOvr>
+</p:notes>
+</file>
+
+<file path=ppt/notesSlides/notesSlide11.xml><?xml version="1.0" encoding="utf-8"?>
+<p:notes xmlns:a="http://schemas.openxmlformats.org/drawingml/2006/main" xmlns:r="http://schemas.openxmlformats.org/officeDocument/2006/relationships" xmlns:p="http://schemas.openxmlformats.org/presentationml/2006/main">
+  <p:cSld>
+    <p:spTree>
+      <p:nvGrpSpPr>
+        <p:cNvPr id="1" name=""/>
+        <p:cNvGrpSpPr/>
+        <p:nvPr/>
+      </p:nvGrpSpPr>
+      <p:grpSpPr>
+        <a:xfrm>
+          <a:off x="0" y="0"/>
+          <a:ext cx="0" cy="0"/>
+          <a:chOff x="0" y="0"/>
+          <a:chExt cx="0" cy="0"/>
+        </a:xfrm>
+      </p:grpSpPr>
+      <p:sp>
+        <p:nvSpPr>
+          <p:cNvPr id="2" name="Slide Image Placeholder 1"/>
+          <p:cNvSpPr>
+            <a:spLocks noGrp="1" noRot="1" noChangeAspect="1"/>
+          </p:cNvSpPr>
+          <p:nvPr>
+            <p:ph type="sldImg"/>
+          </p:nvPr>
+        </p:nvSpPr>
+        <p:spPr/>
+      </p:sp>
+      <p:sp>
+        <p:nvSpPr>
+          <p:cNvPr id="3" name="Notes Placeholder 2"/>
+          <p:cNvSpPr>
+            <a:spLocks noGrp="1"/>
+          </p:cNvSpPr>
+          <p:nvPr>
+            <p:ph type="body" idx="1"/>
+          </p:nvPr>
+        </p:nvSpPr>
+        <p:spPr/>
+        <p:txBody>
+          <a:bodyPr/>
+          <a:lstStyle/>
+          <a:p>
+            <a:endParaRPr lang="en-US"/>
+          </a:p>
+        </p:txBody>
+      </p:sp>
+      <p:sp>
+        <p:nvSpPr>
+          <p:cNvPr id="4" name="Slide Number Placeholder 3"/>
+          <p:cNvSpPr>
+            <a:spLocks noGrp="1"/>
+          </p:cNvSpPr>
+          <p:nvPr>
+            <p:ph type="sldNum" sz="quarter" idx="10"/>
+          </p:nvPr>
+        </p:nvSpPr>
+        <p:spPr/>
+        <p:txBody>
+          <a:bodyPr/>
+          <a:lstStyle/>
+          <a:p>
+            <a:fld id="{0A74898D-8018-420B-8093-0FC091B04356}" type="slidenum">
+              <a:rPr lang="en-US" smtClean="0"/>
+              <a:t>11</a:t>
+            </a:fld>
+            <a:endParaRPr lang="en-US"/>
+          </a:p>
+        </p:txBody>
+      </p:sp>
+    </p:spTree>
+    <p:extLst>
+      <p:ext uri="{BB962C8B-B14F-4D97-AF65-F5344CB8AC3E}">
+        <p14:creationId xmlns:p14="http://schemas.microsoft.com/office/powerpoint/2010/main" val="1600844952"/>
+      </p:ext>
+    </p:extLst>
+  </p:cSld>
+  <p:clrMapOvr>
+    <a:masterClrMapping/>
+  </p:clrMapOvr>
+</p:notes>
+</file>
+
+<file path=ppt/notesSlides/notesSlide12.xml><?xml version="1.0" encoding="utf-8"?>
+<p:notes xmlns:a="http://schemas.openxmlformats.org/drawingml/2006/main" xmlns:r="http://schemas.openxmlformats.org/officeDocument/2006/relationships" xmlns:p="http://schemas.openxmlformats.org/presentationml/2006/main">
+  <p:cSld>
+    <p:spTree>
+      <p:nvGrpSpPr>
+        <p:cNvPr id="1" name=""/>
+        <p:cNvGrpSpPr/>
+        <p:nvPr/>
+      </p:nvGrpSpPr>
+      <p:grpSpPr>
+        <a:xfrm>
+          <a:off x="0" y="0"/>
+          <a:ext cx="0" cy="0"/>
+          <a:chOff x="0" y="0"/>
+          <a:chExt cx="0" cy="0"/>
+        </a:xfrm>
+      </p:grpSpPr>
+      <p:sp>
+        <p:nvSpPr>
+          <p:cNvPr id="2" name="Slide Image Placeholder 1"/>
+          <p:cNvSpPr>
+            <a:spLocks noGrp="1" noRot="1" noChangeAspect="1"/>
+          </p:cNvSpPr>
+          <p:nvPr>
+            <p:ph type="sldImg"/>
+          </p:nvPr>
+        </p:nvSpPr>
+        <p:spPr/>
+      </p:sp>
+      <p:sp>
+        <p:nvSpPr>
+          <p:cNvPr id="3" name="Notes Placeholder 2"/>
+          <p:cNvSpPr>
+            <a:spLocks noGrp="1"/>
+          </p:cNvSpPr>
+          <p:nvPr>
+            <p:ph type="body" idx="1"/>
+          </p:nvPr>
+        </p:nvSpPr>
+        <p:spPr/>
+        <p:txBody>
+          <a:bodyPr/>
+          <a:lstStyle/>
+          <a:p>
+            <a:endParaRPr lang="en-US"/>
+          </a:p>
+        </p:txBody>
+      </p:sp>
+      <p:sp>
+        <p:nvSpPr>
+          <p:cNvPr id="4" name="Slide Number Placeholder 3"/>
+          <p:cNvSpPr>
+            <a:spLocks noGrp="1"/>
+          </p:cNvSpPr>
+          <p:nvPr>
+            <p:ph type="sldNum" sz="quarter" idx="10"/>
+          </p:nvPr>
+        </p:nvSpPr>
+        <p:spPr/>
+        <p:txBody>
+          <a:bodyPr/>
+          <a:lstStyle/>
+          <a:p>
+            <a:fld id="{0A74898D-8018-420B-8093-0FC091B04356}" type="slidenum">
+              <a:rPr lang="en-US" smtClean="0"/>
+              <a:t>12</a:t>
+            </a:fld>
+            <a:endParaRPr lang="en-US"/>
+          </a:p>
+        </p:txBody>
+      </p:sp>
+    </p:spTree>
+    <p:extLst>
+      <p:ext uri="{BB962C8B-B14F-4D97-AF65-F5344CB8AC3E}">
+        <p14:creationId xmlns:p14="http://schemas.microsoft.com/office/powerpoint/2010/main" val="271266843"/>
+      </p:ext>
+    </p:extLst>
+  </p:cSld>
+  <p:clrMapOvr>
+    <a:masterClrMapping/>
+  </p:clrMapOvr>
+</p:notes>
+</file>
+
+<file path=ppt/notesSlides/notesSlide13.xml><?xml version="1.0" encoding="utf-8"?>
+<p:notes xmlns:a="http://schemas.openxmlformats.org/drawingml/2006/main" xmlns:r="http://schemas.openxmlformats.org/officeDocument/2006/relationships" xmlns:p="http://schemas.openxmlformats.org/presentationml/2006/main">
+  <p:cSld>
+    <p:spTree>
+      <p:nvGrpSpPr>
+        <p:cNvPr id="1" name=""/>
+        <p:cNvGrpSpPr/>
+        <p:nvPr/>
+      </p:nvGrpSpPr>
+      <p:grpSpPr>
+        <a:xfrm>
+          <a:off x="0" y="0"/>
+          <a:ext cx="0" cy="0"/>
+          <a:chOff x="0" y="0"/>
+          <a:chExt cx="0" cy="0"/>
+        </a:xfrm>
+      </p:grpSpPr>
+      <p:sp>
+        <p:nvSpPr>
+          <p:cNvPr id="2" name="Slide Image Placeholder 1"/>
+          <p:cNvSpPr>
+            <a:spLocks noGrp="1" noRot="1" noChangeAspect="1"/>
+          </p:cNvSpPr>
+          <p:nvPr>
+            <p:ph type="sldImg"/>
+          </p:nvPr>
+        </p:nvSpPr>
+        <p:spPr/>
+      </p:sp>
+      <p:sp>
+        <p:nvSpPr>
+          <p:cNvPr id="3" name="Notes Placeholder 2"/>
+          <p:cNvSpPr>
+            <a:spLocks noGrp="1"/>
+          </p:cNvSpPr>
+          <p:nvPr>
+            <p:ph type="body" idx="1"/>
+          </p:nvPr>
+        </p:nvSpPr>
+        <p:spPr/>
+        <p:txBody>
+          <a:bodyPr/>
+          <a:lstStyle/>
+          <a:p>
+            <a:endParaRPr lang="en-US"/>
+          </a:p>
+        </p:txBody>
+      </p:sp>
+      <p:sp>
+        <p:nvSpPr>
+          <p:cNvPr id="4" name="Slide Number Placeholder 3"/>
+          <p:cNvSpPr>
+            <a:spLocks noGrp="1"/>
+          </p:cNvSpPr>
+          <p:nvPr>
+            <p:ph type="sldNum" sz="quarter" idx="10"/>
+          </p:nvPr>
+        </p:nvSpPr>
+        <p:spPr/>
+        <p:txBody>
+          <a:bodyPr/>
+          <a:lstStyle/>
+          <a:p>
+            <a:fld id="{0A74898D-8018-420B-8093-0FC091B04356}" type="slidenum">
+              <a:rPr lang="en-US" smtClean="0"/>
+              <a:t>13</a:t>
+            </a:fld>
+            <a:endParaRPr lang="en-US"/>
+          </a:p>
+        </p:txBody>
+      </p:sp>
+    </p:spTree>
+    <p:extLst>
+      <p:ext uri="{BB962C8B-B14F-4D97-AF65-F5344CB8AC3E}">
+        <p14:creationId xmlns:p14="http://schemas.microsoft.com/office/powerpoint/2010/main" val="2051861019"/>
+      </p:ext>
+    </p:extLst>
+  </p:cSld>
+  <p:clrMapOvr>
+    <a:masterClrMapping/>
+  </p:clrMapOvr>
+</p:notes>
+</file>
+
+<file path=ppt/notesSlides/notesSlide14.xml><?xml version="1.0" encoding="utf-8"?>
+<p:notes xmlns:a="http://schemas.openxmlformats.org/drawingml/2006/main" xmlns:r="http://schemas.openxmlformats.org/officeDocument/2006/relationships" xmlns:p="http://schemas.openxmlformats.org/presentationml/2006/main">
+  <p:cSld>
+    <p:spTree>
+      <p:nvGrpSpPr>
+        <p:cNvPr id="1" name=""/>
+        <p:cNvGrpSpPr/>
+        <p:nvPr/>
+      </p:nvGrpSpPr>
+      <p:grpSpPr>
+        <a:xfrm>
+          <a:off x="0" y="0"/>
+          <a:ext cx="0" cy="0"/>
+          <a:chOff x="0" y="0"/>
+          <a:chExt cx="0" cy="0"/>
+        </a:xfrm>
+      </p:grpSpPr>
+      <p:sp>
+        <p:nvSpPr>
+          <p:cNvPr id="2" name="Slide Image Placeholder 1"/>
+          <p:cNvSpPr>
+            <a:spLocks noGrp="1" noRot="1" noChangeAspect="1"/>
+          </p:cNvSpPr>
+          <p:nvPr>
+            <p:ph type="sldImg"/>
+          </p:nvPr>
+        </p:nvSpPr>
+        <p:spPr/>
+      </p:sp>
+      <p:sp>
+        <p:nvSpPr>
+          <p:cNvPr id="3" name="Notes Placeholder 2"/>
+          <p:cNvSpPr>
+            <a:spLocks noGrp="1"/>
+          </p:cNvSpPr>
+          <p:nvPr>
+            <p:ph type="body" idx="1"/>
+          </p:nvPr>
+        </p:nvSpPr>
+        <p:spPr/>
+        <p:txBody>
+          <a:bodyPr/>
+          <a:lstStyle/>
+          <a:p>
+            <a:endParaRPr lang="en-US"/>
+          </a:p>
+        </p:txBody>
+      </p:sp>
+      <p:sp>
+        <p:nvSpPr>
+          <p:cNvPr id="4" name="Slide Number Placeholder 3"/>
+          <p:cNvSpPr>
+            <a:spLocks noGrp="1"/>
+          </p:cNvSpPr>
+          <p:nvPr>
+            <p:ph type="sldNum" sz="quarter" idx="10"/>
+          </p:nvPr>
+        </p:nvSpPr>
+        <p:spPr/>
+        <p:txBody>
+          <a:bodyPr/>
+          <a:lstStyle/>
+          <a:p>
+            <a:fld id="{0A74898D-8018-420B-8093-0FC091B04356}" type="slidenum">
+              <a:rPr lang="en-US" smtClean="0"/>
+              <a:t>14</a:t>
+            </a:fld>
+            <a:endParaRPr lang="en-US"/>
+          </a:p>
+        </p:txBody>
+      </p:sp>
+    </p:spTree>
+    <p:extLst>
+      <p:ext uri="{BB962C8B-B14F-4D97-AF65-F5344CB8AC3E}">
+        <p14:creationId xmlns:p14="http://schemas.microsoft.com/office/powerpoint/2010/main" val="1960074493"/>
+      </p:ext>
+    </p:extLst>
+  </p:cSld>
+  <p:clrMapOvr>
+    <a:masterClrMapping/>
+  </p:clrMapOvr>
+</p:notes>
+</file>
+
+<file path=ppt/notesSlides/notesSlide2.xml><?xml version="1.0" encoding="utf-8"?>
+<p:notes xmlns:a="http://schemas.openxmlformats.org/drawingml/2006/main" xmlns:r="http://schemas.openxmlformats.org/officeDocument/2006/relationships" xmlns:p="http://schemas.openxmlformats.org/presentationml/2006/main">
+  <p:cSld>
+    <p:spTree>
+      <p:nvGrpSpPr>
+        <p:cNvPr id="1" name=""/>
+        <p:cNvGrpSpPr/>
+        <p:nvPr/>
+      </p:nvGrpSpPr>
+      <p:grpSpPr>
+        <a:xfrm>
+          <a:off x="0" y="0"/>
+          <a:ext cx="0" cy="0"/>
+          <a:chOff x="0" y="0"/>
+          <a:chExt cx="0" cy="0"/>
+        </a:xfrm>
+      </p:grpSpPr>
+      <p:sp>
+        <p:nvSpPr>
+          <p:cNvPr id="2" name="Slide Image Placeholder 1"/>
+          <p:cNvSpPr>
+            <a:spLocks noGrp="1" noRot="1" noChangeAspect="1"/>
+          </p:cNvSpPr>
+          <p:nvPr>
+            <p:ph type="sldImg"/>
+          </p:nvPr>
+        </p:nvSpPr>
+        <p:spPr/>
+      </p:sp>
+      <p:sp>
+        <p:nvSpPr>
+          <p:cNvPr id="3" name="Notes Placeholder 2"/>
+          <p:cNvSpPr>
+            <a:spLocks noGrp="1"/>
+          </p:cNvSpPr>
+          <p:nvPr>
+            <p:ph type="body" idx="1"/>
+          </p:nvPr>
+        </p:nvSpPr>
+        <p:spPr/>
+        <p:txBody>
+          <a:bodyPr/>
+          <a:lstStyle/>
+          <a:p>
+            <a:endParaRPr lang="en-US" dirty="0"/>
+          </a:p>
+        </p:txBody>
+      </p:sp>
+      <p:sp>
+        <p:nvSpPr>
+          <p:cNvPr id="4" name="Slide Number Placeholder 3"/>
+          <p:cNvSpPr>
+            <a:spLocks noGrp="1"/>
+          </p:cNvSpPr>
+          <p:nvPr>
+            <p:ph type="sldNum" sz="quarter" idx="10"/>
+          </p:nvPr>
+        </p:nvSpPr>
+        <p:spPr/>
+        <p:txBody>
+          <a:bodyPr/>
+          <a:lstStyle/>
+          <a:p>
+            <a:fld id="{0A74898D-8018-420B-8093-0FC091B04356}" type="slidenum">
+              <a:rPr lang="en-US" smtClean="0"/>
+              <a:t>2</a:t>
+            </a:fld>
+            <a:endParaRPr lang="en-US"/>
+          </a:p>
+        </p:txBody>
+      </p:sp>
+    </p:spTree>
+    <p:extLst>
+      <p:ext uri="{BB962C8B-B14F-4D97-AF65-F5344CB8AC3E}">
+        <p14:creationId xmlns:p14="http://schemas.microsoft.com/office/powerpoint/2010/main" val="2394302736"/>
+      </p:ext>
+    </p:extLst>
+  </p:cSld>
+  <p:clrMapOvr>
+    <a:masterClrMapping/>
+  </p:clrMapOvr>
+</p:notes>
+</file>
+
+<file path=ppt/notesSlides/notesSlide3.xml><?xml version="1.0" encoding="utf-8"?>
+<p:notes xmlns:a="http://schemas.openxmlformats.org/drawingml/2006/main" xmlns:r="http://schemas.openxmlformats.org/officeDocument/2006/relationships" xmlns:p="http://schemas.openxmlformats.org/presentationml/2006/main">
+  <p:cSld>
+    <p:spTree>
+      <p:nvGrpSpPr>
+        <p:cNvPr id="1" name=""/>
+        <p:cNvGrpSpPr/>
+        <p:nvPr/>
+      </p:nvGrpSpPr>
+      <p:grpSpPr>
+        <a:xfrm>
+          <a:off x="0" y="0"/>
+          <a:ext cx="0" cy="0"/>
+          <a:chOff x="0" y="0"/>
+          <a:chExt cx="0" cy="0"/>
+        </a:xfrm>
+      </p:grpSpPr>
+      <p:sp>
+        <p:nvSpPr>
+          <p:cNvPr id="2" name="Slide Image Placeholder 1"/>
+          <p:cNvSpPr>
+            <a:spLocks noGrp="1" noRot="1" noChangeAspect="1"/>
+          </p:cNvSpPr>
+          <p:nvPr>
+            <p:ph type="sldImg"/>
+          </p:nvPr>
+        </p:nvSpPr>
+        <p:spPr/>
+      </p:sp>
+      <p:sp>
+        <p:nvSpPr>
+          <p:cNvPr id="3" name="Notes Placeholder 2"/>
+          <p:cNvSpPr>
+            <a:spLocks noGrp="1"/>
+          </p:cNvSpPr>
+          <p:nvPr>
+            <p:ph type="body" idx="1"/>
+          </p:nvPr>
+        </p:nvSpPr>
+        <p:spPr/>
+        <p:txBody>
+          <a:bodyPr/>
+          <a:lstStyle/>
+          <a:p>
+            <a:endParaRPr lang="en-US"/>
+          </a:p>
+        </p:txBody>
+      </p:sp>
+      <p:sp>
+        <p:nvSpPr>
+          <p:cNvPr id="4" name="Slide Number Placeholder 3"/>
+          <p:cNvSpPr>
+            <a:spLocks noGrp="1"/>
+          </p:cNvSpPr>
+          <p:nvPr>
+            <p:ph type="sldNum" sz="quarter" idx="10"/>
+          </p:nvPr>
+        </p:nvSpPr>
+        <p:spPr/>
+        <p:txBody>
+          <a:bodyPr/>
+          <a:lstStyle/>
+          <a:p>
+            <a:fld id="{0A74898D-8018-420B-8093-0FC091B04356}" type="slidenum">
+              <a:rPr lang="en-US" smtClean="0"/>
+              <a:t>3</a:t>
+            </a:fld>
+            <a:endParaRPr lang="en-US"/>
+          </a:p>
+        </p:txBody>
+      </p:sp>
+    </p:spTree>
+    <p:extLst>
+      <p:ext uri="{BB962C8B-B14F-4D97-AF65-F5344CB8AC3E}">
+        <p14:creationId xmlns:p14="http://schemas.microsoft.com/office/powerpoint/2010/main" val="130081978"/>
+      </p:ext>
+    </p:extLst>
+  </p:cSld>
+  <p:clrMapOvr>
+    <a:masterClrMapping/>
+  </p:clrMapOvr>
+</p:notes>
+</file>
+
+<file path=ppt/notesSlides/notesSlide4.xml><?xml version="1.0" encoding="utf-8"?>
+<p:notes xmlns:a="http://schemas.openxmlformats.org/drawingml/2006/main" xmlns:r="http://schemas.openxmlformats.org/officeDocument/2006/relationships" xmlns:p="http://schemas.openxmlformats.org/presentationml/2006/main">
+  <p:cSld>
+    <p:spTree>
+      <p:nvGrpSpPr>
+        <p:cNvPr id="1" name=""/>
+        <p:cNvGrpSpPr/>
+        <p:nvPr/>
+      </p:nvGrpSpPr>
+      <p:grpSpPr>
+        <a:xfrm>
+          <a:off x="0" y="0"/>
+          <a:ext cx="0" cy="0"/>
+          <a:chOff x="0" y="0"/>
+          <a:chExt cx="0" cy="0"/>
+        </a:xfrm>
+      </p:grpSpPr>
+      <p:sp>
+        <p:nvSpPr>
+          <p:cNvPr id="2" name="Slide Image Placeholder 1"/>
+          <p:cNvSpPr>
+            <a:spLocks noGrp="1" noRot="1" noChangeAspect="1"/>
+          </p:cNvSpPr>
+          <p:nvPr>
+            <p:ph type="sldImg"/>
+          </p:nvPr>
+        </p:nvSpPr>
+        <p:spPr/>
+      </p:sp>
+      <p:sp>
+        <p:nvSpPr>
+          <p:cNvPr id="3" name="Notes Placeholder 2"/>
+          <p:cNvSpPr>
+            <a:spLocks noGrp="1"/>
+          </p:cNvSpPr>
+          <p:nvPr>
+            <p:ph type="body" idx="1"/>
+          </p:nvPr>
+        </p:nvSpPr>
+        <p:spPr/>
+        <p:txBody>
+          <a:bodyPr/>
+          <a:lstStyle/>
+          <a:p>
+            <a:r>
+              <a:rPr lang="en-US" dirty="0" err="1" smtClean="0"/>
+              <a:t>WebForms</a:t>
+            </a:r>
+            <a:r>
+              <a:rPr lang="en-US" dirty="0" smtClean="0"/>
+              <a:t> was a good idea… At the time.  MS </a:t>
+            </a:r>
+            <a:r>
+              <a:rPr lang="en-US" dirty="0" err="1" smtClean="0"/>
+              <a:t>devs</a:t>
+            </a:r>
+            <a:r>
+              <a:rPr lang="en-US" dirty="0" smtClean="0"/>
+              <a:t> didn’t understand the web</a:t>
+            </a:r>
+          </a:p>
+          <a:p>
+            <a:endParaRPr lang="en-US" dirty="0" smtClean="0"/>
+          </a:p>
+          <a:p>
+            <a:r>
+              <a:rPr lang="en-US" dirty="0" smtClean="0"/>
+              <a:t>We understand the web now.</a:t>
+            </a:r>
+            <a:endParaRPr lang="en-US" dirty="0"/>
+          </a:p>
+        </p:txBody>
+      </p:sp>
+      <p:sp>
+        <p:nvSpPr>
+          <p:cNvPr id="4" name="Slide Number Placeholder 3"/>
+          <p:cNvSpPr>
+            <a:spLocks noGrp="1"/>
+          </p:cNvSpPr>
+          <p:nvPr>
+            <p:ph type="sldNum" sz="quarter" idx="10"/>
+          </p:nvPr>
+        </p:nvSpPr>
+        <p:spPr/>
+        <p:txBody>
+          <a:bodyPr/>
+          <a:lstStyle/>
+          <a:p>
+            <a:fld id="{0A74898D-8018-420B-8093-0FC091B04356}" type="slidenum">
+              <a:rPr lang="en-US" smtClean="0"/>
+              <a:t>4</a:t>
+            </a:fld>
+            <a:endParaRPr lang="en-US"/>
+          </a:p>
+        </p:txBody>
+      </p:sp>
+    </p:spTree>
+    <p:extLst>
+      <p:ext uri="{BB962C8B-B14F-4D97-AF65-F5344CB8AC3E}">
+        <p14:creationId xmlns:p14="http://schemas.microsoft.com/office/powerpoint/2010/main" val="2886848938"/>
+      </p:ext>
+    </p:extLst>
+  </p:cSld>
+  <p:clrMapOvr>
+    <a:masterClrMapping/>
+  </p:clrMapOvr>
+</p:notes>
+</file>
+
+<file path=ppt/notesSlides/notesSlide5.xml><?xml version="1.0" encoding="utf-8"?>
+<p:notes xmlns:a="http://schemas.openxmlformats.org/drawingml/2006/main" xmlns:r="http://schemas.openxmlformats.org/officeDocument/2006/relationships" xmlns:p="http://schemas.openxmlformats.org/presentationml/2006/main">
+  <p:cSld>
+    <p:spTree>
+      <p:nvGrpSpPr>
+        <p:cNvPr id="1" name=""/>
+        <p:cNvGrpSpPr/>
+        <p:nvPr/>
+      </p:nvGrpSpPr>
+      <p:grpSpPr>
+        <a:xfrm>
+          <a:off x="0" y="0"/>
+          <a:ext cx="0" cy="0"/>
+          <a:chOff x="0" y="0"/>
+          <a:chExt cx="0" cy="0"/>
+        </a:xfrm>
+      </p:grpSpPr>
+      <p:sp>
+        <p:nvSpPr>
+          <p:cNvPr id="2" name="Slide Image Placeholder 1"/>
+          <p:cNvSpPr>
+            <a:spLocks noGrp="1" noRot="1" noChangeAspect="1"/>
+          </p:cNvSpPr>
+          <p:nvPr>
+            <p:ph type="sldImg"/>
+          </p:nvPr>
+        </p:nvSpPr>
+        <p:spPr/>
+      </p:sp>
+      <p:sp>
+        <p:nvSpPr>
+          <p:cNvPr id="3" name="Notes Placeholder 2"/>
+          <p:cNvSpPr>
+            <a:spLocks noGrp="1"/>
+          </p:cNvSpPr>
+          <p:nvPr>
+            <p:ph type="body" idx="1"/>
+          </p:nvPr>
+        </p:nvSpPr>
+        <p:spPr/>
+        <p:txBody>
+          <a:bodyPr/>
+          <a:lstStyle/>
+          <a:p>
+            <a:r>
+              <a:rPr lang="en-US" dirty="0" err="1" smtClean="0"/>
+              <a:t>System.Web</a:t>
+            </a:r>
+            <a:r>
+              <a:rPr lang="en-US" baseline="0" dirty="0" smtClean="0"/>
+              <a:t> carries the bulk of that legacy baggage – trying to make the web </a:t>
+            </a:r>
+            <a:r>
+              <a:rPr lang="en-US" baseline="0" dirty="0" err="1" smtClean="0"/>
+              <a:t>statefull</a:t>
+            </a:r>
+            <a:endParaRPr lang="en-US" baseline="0" dirty="0" smtClean="0"/>
+          </a:p>
+          <a:p>
+            <a:endParaRPr lang="en-US" baseline="0" dirty="0" smtClean="0"/>
+          </a:p>
+          <a:p>
+            <a:r>
+              <a:rPr lang="en-US" baseline="0" dirty="0" smtClean="0"/>
+              <a:t>30k per request is a lot – especially for a “</a:t>
+            </a:r>
+            <a:r>
+              <a:rPr lang="en-US" baseline="0" dirty="0" err="1" smtClean="0"/>
+              <a:t>lightweifght</a:t>
+            </a:r>
+            <a:r>
+              <a:rPr lang="en-US" baseline="0" dirty="0" smtClean="0"/>
+              <a:t>” restful web service call</a:t>
+            </a:r>
+          </a:p>
+        </p:txBody>
+      </p:sp>
+      <p:sp>
+        <p:nvSpPr>
+          <p:cNvPr id="4" name="Slide Number Placeholder 3"/>
+          <p:cNvSpPr>
+            <a:spLocks noGrp="1"/>
+          </p:cNvSpPr>
+          <p:nvPr>
+            <p:ph type="sldNum" sz="quarter" idx="10"/>
+          </p:nvPr>
+        </p:nvSpPr>
+        <p:spPr/>
+        <p:txBody>
+          <a:bodyPr/>
+          <a:lstStyle/>
+          <a:p>
+            <a:fld id="{0A74898D-8018-420B-8093-0FC091B04356}" type="slidenum">
+              <a:rPr lang="en-US" smtClean="0"/>
+              <a:t>5</a:t>
+            </a:fld>
+            <a:endParaRPr lang="en-US"/>
+          </a:p>
+        </p:txBody>
+      </p:sp>
+    </p:spTree>
+    <p:extLst>
+      <p:ext uri="{BB962C8B-B14F-4D97-AF65-F5344CB8AC3E}">
+        <p14:creationId xmlns:p14="http://schemas.microsoft.com/office/powerpoint/2010/main" val="310855405"/>
+      </p:ext>
+    </p:extLst>
+  </p:cSld>
+  <p:clrMapOvr>
+    <a:masterClrMapping/>
+  </p:clrMapOvr>
+</p:notes>
+</file>
+
+<file path=ppt/notesSlides/notesSlide6.xml><?xml version="1.0" encoding="utf-8"?>
+<p:notes xmlns:a="http://schemas.openxmlformats.org/drawingml/2006/main" xmlns:r="http://schemas.openxmlformats.org/officeDocument/2006/relationships" xmlns:p="http://schemas.openxmlformats.org/presentationml/2006/main">
+  <p:cSld>
+    <p:spTree>
+      <p:nvGrpSpPr>
+        <p:cNvPr id="1" name=""/>
+        <p:cNvGrpSpPr/>
+        <p:nvPr/>
+      </p:nvGrpSpPr>
+      <p:grpSpPr>
+        <a:xfrm>
+          <a:off x="0" y="0"/>
+          <a:ext cx="0" cy="0"/>
+          <a:chOff x="0" y="0"/>
+          <a:chExt cx="0" cy="0"/>
+        </a:xfrm>
+      </p:grpSpPr>
+      <p:sp>
+        <p:nvSpPr>
+          <p:cNvPr id="2" name="Slide Image Placeholder 1"/>
+          <p:cNvSpPr>
+            <a:spLocks noGrp="1" noRot="1" noChangeAspect="1"/>
+          </p:cNvSpPr>
+          <p:nvPr>
+            <p:ph type="sldImg"/>
+          </p:nvPr>
+        </p:nvSpPr>
+        <p:spPr/>
+      </p:sp>
+      <p:sp>
+        <p:nvSpPr>
+          <p:cNvPr id="3" name="Notes Placeholder 2"/>
+          <p:cNvSpPr>
+            <a:spLocks noGrp="1"/>
+          </p:cNvSpPr>
+          <p:nvPr>
+            <p:ph type="body" idx="1"/>
+          </p:nvPr>
+        </p:nvSpPr>
+        <p:spPr/>
+        <p:txBody>
+          <a:bodyPr/>
+          <a:lstStyle/>
+          <a:p>
+            <a:endParaRPr lang="en-US" dirty="0"/>
+          </a:p>
+        </p:txBody>
+      </p:sp>
+      <p:sp>
+        <p:nvSpPr>
+          <p:cNvPr id="4" name="Slide Number Placeholder 3"/>
+          <p:cNvSpPr>
+            <a:spLocks noGrp="1"/>
+          </p:cNvSpPr>
+          <p:nvPr>
+            <p:ph type="sldNum" sz="quarter" idx="10"/>
+          </p:nvPr>
+        </p:nvSpPr>
+        <p:spPr/>
+        <p:txBody>
+          <a:bodyPr/>
+          <a:lstStyle/>
+          <a:p>
+            <a:fld id="{0A74898D-8018-420B-8093-0FC091B04356}" type="slidenum">
+              <a:rPr lang="en-US" smtClean="0"/>
+              <a:t>6</a:t>
+            </a:fld>
+            <a:endParaRPr lang="en-US"/>
+          </a:p>
+        </p:txBody>
+      </p:sp>
+    </p:spTree>
+    <p:extLst>
+      <p:ext uri="{BB962C8B-B14F-4D97-AF65-F5344CB8AC3E}">
+        <p14:creationId xmlns:p14="http://schemas.microsoft.com/office/powerpoint/2010/main" val="2377940051"/>
+      </p:ext>
+    </p:extLst>
+  </p:cSld>
+  <p:clrMapOvr>
+    <a:masterClrMapping/>
+  </p:clrMapOvr>
+</p:notes>
+</file>
+
+<file path=ppt/notesSlides/notesSlide7.xml><?xml version="1.0" encoding="utf-8"?>
+<p:notes xmlns:a="http://schemas.openxmlformats.org/drawingml/2006/main" xmlns:r="http://schemas.openxmlformats.org/officeDocument/2006/relationships" xmlns:p="http://schemas.openxmlformats.org/presentationml/2006/main">
+  <p:cSld>
+    <p:spTree>
+      <p:nvGrpSpPr>
+        <p:cNvPr id="1" name=""/>
+        <p:cNvGrpSpPr/>
+        <p:nvPr/>
+      </p:nvGrpSpPr>
+      <p:grpSpPr>
+        <a:xfrm>
+          <a:off x="0" y="0"/>
+          <a:ext cx="0" cy="0"/>
+          <a:chOff x="0" y="0"/>
+          <a:chExt cx="0" cy="0"/>
+        </a:xfrm>
+      </p:grpSpPr>
+      <p:sp>
+        <p:nvSpPr>
+          <p:cNvPr id="2" name="Slide Image Placeholder 1"/>
+          <p:cNvSpPr>
+            <a:spLocks noGrp="1" noRot="1" noChangeAspect="1"/>
+          </p:cNvSpPr>
+          <p:nvPr>
+            <p:ph type="sldImg"/>
+          </p:nvPr>
+        </p:nvSpPr>
+        <p:spPr/>
+      </p:sp>
+      <p:sp>
+        <p:nvSpPr>
+          <p:cNvPr id="3" name="Notes Placeholder 2"/>
+          <p:cNvSpPr>
+            <a:spLocks noGrp="1"/>
+          </p:cNvSpPr>
+          <p:nvPr>
+            <p:ph type="body" idx="1"/>
+          </p:nvPr>
+        </p:nvSpPr>
+        <p:spPr/>
+        <p:txBody>
+          <a:bodyPr/>
+          <a:lstStyle/>
+          <a:p>
+            <a:r>
+              <a:rPr lang="en-US" dirty="0" smtClean="0"/>
+              <a:t>When running in VS, I believe</a:t>
+            </a:r>
+            <a:r>
+              <a:rPr lang="en-US" baseline="0" dirty="0" smtClean="0"/>
+              <a:t> you have the automatic refreshing/re-building – but we’re not doing it that way today.</a:t>
+            </a:r>
+            <a:endParaRPr lang="en-US" dirty="0"/>
+          </a:p>
+        </p:txBody>
+      </p:sp>
+      <p:sp>
+        <p:nvSpPr>
+          <p:cNvPr id="4" name="Slide Number Placeholder 3"/>
+          <p:cNvSpPr>
+            <a:spLocks noGrp="1"/>
+          </p:cNvSpPr>
+          <p:nvPr>
+            <p:ph type="sldNum" sz="quarter" idx="10"/>
+          </p:nvPr>
+        </p:nvSpPr>
+        <p:spPr/>
+        <p:txBody>
+          <a:bodyPr/>
+          <a:lstStyle/>
+          <a:p>
+            <a:fld id="{0A74898D-8018-420B-8093-0FC091B04356}" type="slidenum">
+              <a:rPr lang="en-US" smtClean="0"/>
+              <a:t>7</a:t>
+            </a:fld>
+            <a:endParaRPr lang="en-US"/>
+          </a:p>
+        </p:txBody>
+      </p:sp>
+    </p:spTree>
+    <p:extLst>
+      <p:ext uri="{BB962C8B-B14F-4D97-AF65-F5344CB8AC3E}">
+        <p14:creationId xmlns:p14="http://schemas.microsoft.com/office/powerpoint/2010/main" val="1560097733"/>
+      </p:ext>
+    </p:extLst>
+  </p:cSld>
+  <p:clrMapOvr>
+    <a:masterClrMapping/>
+  </p:clrMapOvr>
+</p:notes>
+</file>
+
+<file path=ppt/notesSlides/notesSlide8.xml><?xml version="1.0" encoding="utf-8"?>
+<p:notes xmlns:a="http://schemas.openxmlformats.org/drawingml/2006/main" xmlns:r="http://schemas.openxmlformats.org/officeDocument/2006/relationships" xmlns:p="http://schemas.openxmlformats.org/presentationml/2006/main">
+  <p:cSld>
+    <p:spTree>
+      <p:nvGrpSpPr>
+        <p:cNvPr id="1" name=""/>
+        <p:cNvGrpSpPr/>
+        <p:nvPr/>
+      </p:nvGrpSpPr>
+      <p:grpSpPr>
+        <a:xfrm>
+          <a:off x="0" y="0"/>
+          <a:ext cx="0" cy="0"/>
+          <a:chOff x="0" y="0"/>
+          <a:chExt cx="0" cy="0"/>
+        </a:xfrm>
+      </p:grpSpPr>
+      <p:sp>
+        <p:nvSpPr>
+          <p:cNvPr id="2" name="Slide Image Placeholder 1"/>
+          <p:cNvSpPr>
+            <a:spLocks noGrp="1" noRot="1" noChangeAspect="1"/>
+          </p:cNvSpPr>
+          <p:nvPr>
+            <p:ph type="sldImg"/>
+          </p:nvPr>
+        </p:nvSpPr>
+        <p:spPr/>
+      </p:sp>
+      <p:sp>
+        <p:nvSpPr>
+          <p:cNvPr id="3" name="Notes Placeholder 2"/>
+          <p:cNvSpPr>
+            <a:spLocks noGrp="1"/>
+          </p:cNvSpPr>
+          <p:nvPr>
+            <p:ph type="body" idx="1"/>
+          </p:nvPr>
+        </p:nvSpPr>
+        <p:spPr/>
+        <p:txBody>
+          <a:bodyPr/>
+          <a:lstStyle/>
+          <a:p>
+            <a:r>
+              <a:rPr lang="en-US" dirty="0" smtClean="0"/>
+              <a:t>Even your project’s output is a NuGet package</a:t>
+            </a:r>
+          </a:p>
+        </p:txBody>
+      </p:sp>
+      <p:sp>
+        <p:nvSpPr>
+          <p:cNvPr id="4" name="Slide Number Placeholder 3"/>
+          <p:cNvSpPr>
+            <a:spLocks noGrp="1"/>
+          </p:cNvSpPr>
+          <p:nvPr>
+            <p:ph type="sldNum" sz="quarter" idx="10"/>
+          </p:nvPr>
+        </p:nvSpPr>
+        <p:spPr/>
+        <p:txBody>
+          <a:bodyPr/>
+          <a:lstStyle/>
+          <a:p>
+            <a:fld id="{0A74898D-8018-420B-8093-0FC091B04356}" type="slidenum">
+              <a:rPr lang="en-US" smtClean="0"/>
+              <a:t>8</a:t>
+            </a:fld>
+            <a:endParaRPr lang="en-US"/>
+          </a:p>
+        </p:txBody>
+      </p:sp>
+    </p:spTree>
+    <p:extLst>
+      <p:ext uri="{BB962C8B-B14F-4D97-AF65-F5344CB8AC3E}">
+        <p14:creationId xmlns:p14="http://schemas.microsoft.com/office/powerpoint/2010/main" val="1256779251"/>
+      </p:ext>
+    </p:extLst>
+  </p:cSld>
+  <p:clrMapOvr>
+    <a:masterClrMapping/>
+  </p:clrMapOvr>
+</p:notes>
+</file>
+
+<file path=ppt/notesSlides/notesSlide9.xml><?xml version="1.0" encoding="utf-8"?>
+<p:notes xmlns:a="http://schemas.openxmlformats.org/drawingml/2006/main" xmlns:r="http://schemas.openxmlformats.org/officeDocument/2006/relationships" xmlns:p="http://schemas.openxmlformats.org/presentationml/2006/main">
+  <p:cSld>
+    <p:spTree>
+      <p:nvGrpSpPr>
+        <p:cNvPr id="1" name=""/>
+        <p:cNvGrpSpPr/>
+        <p:nvPr/>
+      </p:nvGrpSpPr>
+      <p:grpSpPr>
+        <a:xfrm>
+          <a:off x="0" y="0"/>
+          <a:ext cx="0" cy="0"/>
+          <a:chOff x="0" y="0"/>
+          <a:chExt cx="0" cy="0"/>
+        </a:xfrm>
+      </p:grpSpPr>
+      <p:sp>
+        <p:nvSpPr>
+          <p:cNvPr id="2" name="Slide Image Placeholder 1"/>
+          <p:cNvSpPr>
+            <a:spLocks noGrp="1" noRot="1" noChangeAspect="1"/>
+          </p:cNvSpPr>
+          <p:nvPr>
+            <p:ph type="sldImg"/>
+          </p:nvPr>
+        </p:nvSpPr>
+        <p:spPr/>
+      </p:sp>
+      <p:sp>
+        <p:nvSpPr>
+          <p:cNvPr id="3" name="Notes Placeholder 2"/>
+          <p:cNvSpPr>
+            <a:spLocks noGrp="1"/>
+          </p:cNvSpPr>
+          <p:nvPr>
+            <p:ph type="body" idx="1"/>
+          </p:nvPr>
+        </p:nvSpPr>
+        <p:spPr/>
+        <p:txBody>
+          <a:bodyPr/>
+          <a:lstStyle/>
+          <a:p>
+            <a:endParaRPr lang="en-US"/>
+          </a:p>
+        </p:txBody>
+      </p:sp>
+      <p:sp>
+        <p:nvSpPr>
+          <p:cNvPr id="4" name="Slide Number Placeholder 3"/>
+          <p:cNvSpPr>
+            <a:spLocks noGrp="1"/>
+          </p:cNvSpPr>
+          <p:nvPr>
+            <p:ph type="sldNum" sz="quarter" idx="10"/>
+          </p:nvPr>
+        </p:nvSpPr>
+        <p:spPr/>
+        <p:txBody>
+          <a:bodyPr/>
+          <a:lstStyle/>
+          <a:p>
+            <a:fld id="{0A74898D-8018-420B-8093-0FC091B04356}" type="slidenum">
+              <a:rPr lang="en-US" smtClean="0"/>
+              <a:t>9</a:t>
+            </a:fld>
+            <a:endParaRPr lang="en-US"/>
+          </a:p>
+        </p:txBody>
+      </p:sp>
+    </p:spTree>
+    <p:extLst>
+      <p:ext uri="{BB962C8B-B14F-4D97-AF65-F5344CB8AC3E}">
+        <p14:creationId xmlns:p14="http://schemas.microsoft.com/office/powerpoint/2010/main" val="108265549"/>
+      </p:ext>
+    </p:extLst>
+  </p:cSld>
+  <p:clrMapOvr>
+    <a:masterClrMapping/>
+  </p:clrMapOvr>
+</p:notes>
 </file>
 
 <file path=ppt/slideLayouts/slideLayout1.xml><?xml version="1.0" encoding="utf-8"?>
@@ -625,7 +2225,7 @@
             <a:fld id="{B61BEF0D-F0BB-DE4B-95CE-6DB70DBA9567}" type="datetimeFigureOut">
               <a:rPr lang="en-US" dirty="0"/>
               <a:pPr/>
-              <a:t>7/19/2014</a:t>
+              <a:t>9/2/2014</a:t>
             </a:fld>
             <a:endParaRPr lang="en-US" dirty="0"/>
           </a:p>
@@ -930,7 +2530,7 @@
             <a:fld id="{B61BEF0D-F0BB-DE4B-95CE-6DB70DBA9567}" type="datetimeFigureOut">
               <a:rPr lang="en-US" dirty="0"/>
               <a:pPr/>
-              <a:t>7/19/2014</a:t>
+              <a:t>9/2/2014</a:t>
             </a:fld>
             <a:endParaRPr lang="en-US" dirty="0"/>
           </a:p>
@@ -1187,7 +2787,7 @@
             <a:fld id="{B61BEF0D-F0BB-DE4B-95CE-6DB70DBA9567}" type="datetimeFigureOut">
               <a:rPr lang="en-US" dirty="0"/>
               <a:pPr/>
-              <a:t>7/19/2014</a:t>
+              <a:t>9/2/2014</a:t>
             </a:fld>
             <a:endParaRPr lang="en-US" dirty="0"/>
           </a:p>
@@ -1736,7 +3336,7 @@
             <a:fld id="{B61BEF0D-F0BB-DE4B-95CE-6DB70DBA9567}" type="datetimeFigureOut">
               <a:rPr lang="en-US" dirty="0"/>
               <a:pPr/>
-              <a:t>7/19/2014</a:t>
+              <a:t>9/2/2014</a:t>
             </a:fld>
             <a:endParaRPr lang="en-US" dirty="0"/>
           </a:p>
@@ -1993,7 +3593,7 @@
             <a:fld id="{B61BEF0D-F0BB-DE4B-95CE-6DB70DBA9567}" type="datetimeFigureOut">
               <a:rPr lang="en-US" dirty="0"/>
               <a:pPr/>
-              <a:t>7/19/2014</a:t>
+              <a:t>9/2/2014</a:t>
             </a:fld>
             <a:endParaRPr lang="en-US" dirty="0"/>
           </a:p>
@@ -2534,7 +4134,7 @@
             <a:fld id="{B61BEF0D-F0BB-DE4B-95CE-6DB70DBA9567}" type="datetimeFigureOut">
               <a:rPr lang="en-US" dirty="0"/>
               <a:pPr/>
-              <a:t>7/19/2014</a:t>
+              <a:t>9/2/2014</a:t>
             </a:fld>
             <a:endParaRPr lang="en-US" dirty="0"/>
           </a:p>
@@ -2840,7 +4440,7 @@
             <a:fld id="{B61BEF0D-F0BB-DE4B-95CE-6DB70DBA9567}" type="datetimeFigureOut">
               <a:rPr lang="en-US" dirty="0"/>
               <a:pPr/>
-              <a:t>7/19/2014</a:t>
+              <a:t>9/2/2014</a:t>
             </a:fld>
             <a:endParaRPr lang="en-US" dirty="0"/>
           </a:p>
@@ -3023,7 +4623,7 @@
             <a:fld id="{B61BEF0D-F0BB-DE4B-95CE-6DB70DBA9567}" type="datetimeFigureOut">
               <a:rPr lang="en-US" dirty="0"/>
               <a:pPr/>
-              <a:t>7/19/2014</a:t>
+              <a:t>9/2/2014</a:t>
             </a:fld>
             <a:endParaRPr lang="en-US" dirty="0"/>
           </a:p>
@@ -3212,7 +4812,7 @@
             <a:fld id="{B61BEF0D-F0BB-DE4B-95CE-6DB70DBA9567}" type="datetimeFigureOut">
               <a:rPr lang="en-US" dirty="0"/>
               <a:pPr/>
-              <a:t>7/19/2014</a:t>
+              <a:t>9/2/2014</a:t>
             </a:fld>
             <a:endParaRPr lang="en-US" dirty="0"/>
           </a:p>
@@ -3401,7 +5001,7 @@
             <a:fld id="{B61BEF0D-F0BB-DE4B-95CE-6DB70DBA9567}" type="datetimeFigureOut">
               <a:rPr lang="en-US" dirty="0"/>
               <a:pPr/>
-              <a:t>7/19/2014</a:t>
+              <a:t>9/2/2014</a:t>
             </a:fld>
             <a:endParaRPr lang="en-US" dirty="0"/>
           </a:p>
@@ -3661,7 +5261,7 @@
             <a:fld id="{B61BEF0D-F0BB-DE4B-95CE-6DB70DBA9567}" type="datetimeFigureOut">
               <a:rPr lang="en-US" dirty="0"/>
               <a:pPr/>
-              <a:t>7/19/2014</a:t>
+              <a:t>9/2/2014</a:t>
             </a:fld>
             <a:endParaRPr lang="en-US" dirty="0"/>
           </a:p>
@@ -3967,7 +5567,7 @@
             <a:fld id="{B61BEF0D-F0BB-DE4B-95CE-6DB70DBA9567}" type="datetimeFigureOut">
               <a:rPr lang="en-US" dirty="0"/>
               <a:pPr/>
-              <a:t>7/19/2014</a:t>
+              <a:t>9/2/2014</a:t>
             </a:fld>
             <a:endParaRPr lang="en-US" dirty="0"/>
           </a:p>
@@ -4418,7 +6018,7 @@
             <a:fld id="{B61BEF0D-F0BB-DE4B-95CE-6DB70DBA9567}" type="datetimeFigureOut">
               <a:rPr lang="en-US" dirty="0"/>
               <a:pPr/>
-              <a:t>7/19/2014</a:t>
+              <a:t>9/2/2014</a:t>
             </a:fld>
             <a:endParaRPr lang="en-US" dirty="0"/>
           </a:p>
@@ -4545,7 +6145,7 @@
             <a:fld id="{B61BEF0D-F0BB-DE4B-95CE-6DB70DBA9567}" type="datetimeFigureOut">
               <a:rPr lang="en-US" dirty="0"/>
               <a:pPr/>
-              <a:t>7/19/2014</a:t>
+              <a:t>9/2/2014</a:t>
             </a:fld>
             <a:endParaRPr lang="en-US" dirty="0"/>
           </a:p>
@@ -4649,7 +6249,7 @@
             <a:fld id="{B61BEF0D-F0BB-DE4B-95CE-6DB70DBA9567}" type="datetimeFigureOut">
               <a:rPr lang="en-US" dirty="0"/>
               <a:pPr/>
-              <a:t>7/19/2014</a:t>
+              <a:t>9/2/2014</a:t>
             </a:fld>
             <a:endParaRPr lang="en-US" dirty="0"/>
           </a:p>
@@ -4941,7 +6541,7 @@
             <a:fld id="{B61BEF0D-F0BB-DE4B-95CE-6DB70DBA9567}" type="datetimeFigureOut">
               <a:rPr lang="en-US" dirty="0"/>
               <a:pPr/>
-              <a:t>7/19/2014</a:t>
+              <a:t>9/2/2014</a:t>
             </a:fld>
             <a:endParaRPr lang="en-US" dirty="0"/>
           </a:p>
@@ -5241,7 +6841,7 @@
             <a:fld id="{B61BEF0D-F0BB-DE4B-95CE-6DB70DBA9567}" type="datetimeFigureOut">
               <a:rPr lang="en-US" dirty="0"/>
               <a:pPr/>
-              <a:t>7/19/2014</a:t>
+              <a:t>9/2/2014</a:t>
             </a:fld>
             <a:endParaRPr lang="en-US" dirty="0"/>
           </a:p>
@@ -5780,7 +7380,7 @@
             <a:fld id="{B61BEF0D-F0BB-DE4B-95CE-6DB70DBA9567}" type="datetimeFigureOut">
               <a:rPr lang="en-US" dirty="0"/>
               <a:pPr/>
-              <a:t>7/19/2014</a:t>
+              <a:t>9/2/2014</a:t>
             </a:fld>
             <a:endParaRPr lang="en-US" dirty="0"/>
           </a:p>
@@ -6447,7 +8047,885 @@
           <a:p>
             <a:r>
               <a:rPr lang="en-US" dirty="0" smtClean="0"/>
-              <a:t>DEMOS!</a:t>
+              <a:t>Before we </a:t>
+            </a:r>
+            <a:r>
+              <a:rPr lang="en-US" dirty="0" smtClean="0"/>
+              <a:t>Begin…</a:t>
+            </a:r>
+            <a:endParaRPr lang="en-US" dirty="0"/>
+          </a:p>
+        </p:txBody>
+      </p:sp>
+      <p:sp>
+        <p:nvSpPr>
+          <p:cNvPr id="3" name="Content Placeholder 2"/>
+          <p:cNvSpPr>
+            <a:spLocks noGrp="1"/>
+          </p:cNvSpPr>
+          <p:nvPr>
+            <p:ph idx="1"/>
+          </p:nvPr>
+        </p:nvSpPr>
+        <p:spPr/>
+        <p:txBody>
+          <a:bodyPr/>
+          <a:lstStyle/>
+          <a:p>
+            <a:r>
+              <a:rPr lang="en-US" dirty="0" smtClean="0"/>
+              <a:t>This is SUPER early</a:t>
+            </a:r>
+          </a:p>
+          <a:p>
+            <a:r>
+              <a:rPr lang="en-US" dirty="0" smtClean="0"/>
+              <a:t>Very volatile code – breaking changes are frequent</a:t>
+            </a:r>
+          </a:p>
+          <a:p>
+            <a:r>
+              <a:rPr lang="en-US" dirty="0" smtClean="0"/>
+              <a:t>Lots of things are missing.  Some things don’t work right</a:t>
+            </a:r>
+          </a:p>
+          <a:p>
+            <a:r>
+              <a:rPr lang="en-US" dirty="0" smtClean="0"/>
+              <a:t>It’s an unprecedented level of openness for Microsoft</a:t>
+            </a:r>
+          </a:p>
+          <a:p>
+            <a:pPr lvl="1"/>
+            <a:r>
+              <a:rPr lang="en-US" dirty="0" smtClean="0"/>
+              <a:t>Code is on GitHub (yes – they take pull requests)</a:t>
+            </a:r>
+          </a:p>
+          <a:p>
+            <a:pPr lvl="1"/>
+            <a:r>
+              <a:rPr lang="en-US" dirty="0" smtClean="0"/>
+              <a:t>Backlog and sprint planning is open and accessible on </a:t>
+            </a:r>
+            <a:r>
+              <a:rPr lang="en-US" dirty="0" err="1" smtClean="0"/>
+              <a:t>HuBoard</a:t>
+            </a:r>
+            <a:r>
+              <a:rPr lang="en-US" dirty="0" smtClean="0"/>
+              <a:t> </a:t>
+            </a:r>
+          </a:p>
+          <a:p>
+            <a:endParaRPr lang="en-US" dirty="0" smtClean="0"/>
+          </a:p>
+          <a:p>
+            <a:r>
+              <a:rPr lang="en-US" dirty="0" smtClean="0"/>
+              <a:t>With that said…</a:t>
+            </a:r>
+            <a:endParaRPr lang="en-US" dirty="0"/>
+          </a:p>
+        </p:txBody>
+      </p:sp>
+    </p:spTree>
+    <p:extLst>
+      <p:ext uri="{BB962C8B-B14F-4D97-AF65-F5344CB8AC3E}">
+        <p14:creationId xmlns:p14="http://schemas.microsoft.com/office/powerpoint/2010/main" val="3826486159"/>
+      </p:ext>
+    </p:extLst>
+  </p:cSld>
+  <p:clrMapOvr>
+    <a:masterClrMapping/>
+  </p:clrMapOvr>
+  <mc:AlternateContent xmlns:mc="http://schemas.openxmlformats.org/markup-compatibility/2006" xmlns:p14="http://schemas.microsoft.com/office/powerpoint/2010/main">
+    <mc:Choice Requires="p14">
+      <p:transition spd="slow">
+        <p14:glitter pattern="hexagon"/>
+      </p:transition>
+    </mc:Choice>
+    <mc:Fallback xmlns="">
+      <p:transition spd="slow">
+        <p:fade/>
+      </p:transition>
+    </mc:Fallback>
+  </mc:AlternateContent>
+  <p:timing>
+    <p:tnLst>
+      <p:par>
+        <p:cTn id="1" dur="indefinite" restart="never" nodeType="tmRoot">
+          <p:childTnLst>
+            <p:seq concurrent="1" nextAc="seek">
+              <p:cTn id="2" dur="indefinite" nodeType="mainSeq">
+                <p:childTnLst>
+                  <p:par>
+                    <p:cTn id="3" fill="hold">
+                      <p:stCondLst>
+                        <p:cond delay="indefinite"/>
+                      </p:stCondLst>
+                      <p:childTnLst>
+                        <p:par>
+                          <p:cTn id="4" fill="hold">
+                            <p:stCondLst>
+                              <p:cond delay="0"/>
+                            </p:stCondLst>
+                            <p:childTnLst>
+                              <p:par>
+                                <p:cTn id="5" presetID="10" presetClass="entr" presetSubtype="0" fill="hold" grpId="0" nodeType="clickEffect">
+                                  <p:stCondLst>
+                                    <p:cond delay="0"/>
+                                  </p:stCondLst>
+                                  <p:childTnLst>
+                                    <p:set>
+                                      <p:cBhvr>
+                                        <p:cTn id="6" dur="1" fill="hold">
+                                          <p:stCondLst>
+                                            <p:cond delay="0"/>
+                                          </p:stCondLst>
+                                        </p:cTn>
+                                        <p:tgtEl>
+                                          <p:spTgt spid="3">
+                                            <p:txEl>
+                                              <p:pRg st="0" end="0"/>
+                                            </p:txEl>
+                                          </p:spTgt>
+                                        </p:tgtEl>
+                                        <p:attrNameLst>
+                                          <p:attrName>style.visibility</p:attrName>
+                                        </p:attrNameLst>
+                                      </p:cBhvr>
+                                      <p:to>
+                                        <p:strVal val="visible"/>
+                                      </p:to>
+                                    </p:set>
+                                    <p:animEffect transition="in" filter="fade">
+                                      <p:cBhvr>
+                                        <p:cTn id="7" dur="500"/>
+                                        <p:tgtEl>
+                                          <p:spTgt spid="3">
+                                            <p:txEl>
+                                              <p:pRg st="0" end="0"/>
+                                            </p:txEl>
+                                          </p:spTgt>
+                                        </p:tgtEl>
+                                      </p:cBhvr>
+                                    </p:animEffect>
+                                  </p:childTnLst>
+                                </p:cTn>
+                              </p:par>
+                            </p:childTnLst>
+                          </p:cTn>
+                        </p:par>
+                      </p:childTnLst>
+                    </p:cTn>
+                  </p:par>
+                  <p:par>
+                    <p:cTn id="8" fill="hold">
+                      <p:stCondLst>
+                        <p:cond delay="indefinite"/>
+                      </p:stCondLst>
+                      <p:childTnLst>
+                        <p:par>
+                          <p:cTn id="9" fill="hold">
+                            <p:stCondLst>
+                              <p:cond delay="0"/>
+                            </p:stCondLst>
+                            <p:childTnLst>
+                              <p:par>
+                                <p:cTn id="10" presetID="10" presetClass="entr" presetSubtype="0" fill="hold" grpId="0" nodeType="clickEffect">
+                                  <p:stCondLst>
+                                    <p:cond delay="0"/>
+                                  </p:stCondLst>
+                                  <p:childTnLst>
+                                    <p:set>
+                                      <p:cBhvr>
+                                        <p:cTn id="11" dur="1" fill="hold">
+                                          <p:stCondLst>
+                                            <p:cond delay="0"/>
+                                          </p:stCondLst>
+                                        </p:cTn>
+                                        <p:tgtEl>
+                                          <p:spTgt spid="3">
+                                            <p:txEl>
+                                              <p:pRg st="1" end="1"/>
+                                            </p:txEl>
+                                          </p:spTgt>
+                                        </p:tgtEl>
+                                        <p:attrNameLst>
+                                          <p:attrName>style.visibility</p:attrName>
+                                        </p:attrNameLst>
+                                      </p:cBhvr>
+                                      <p:to>
+                                        <p:strVal val="visible"/>
+                                      </p:to>
+                                    </p:set>
+                                    <p:animEffect transition="in" filter="fade">
+                                      <p:cBhvr>
+                                        <p:cTn id="12" dur="500"/>
+                                        <p:tgtEl>
+                                          <p:spTgt spid="3">
+                                            <p:txEl>
+                                              <p:pRg st="1" end="1"/>
+                                            </p:txEl>
+                                          </p:spTgt>
+                                        </p:tgtEl>
+                                      </p:cBhvr>
+                                    </p:animEffect>
+                                  </p:childTnLst>
+                                </p:cTn>
+                              </p:par>
+                            </p:childTnLst>
+                          </p:cTn>
+                        </p:par>
+                      </p:childTnLst>
+                    </p:cTn>
+                  </p:par>
+                  <p:par>
+                    <p:cTn id="13" fill="hold">
+                      <p:stCondLst>
+                        <p:cond delay="indefinite"/>
+                      </p:stCondLst>
+                      <p:childTnLst>
+                        <p:par>
+                          <p:cTn id="14" fill="hold">
+                            <p:stCondLst>
+                              <p:cond delay="0"/>
+                            </p:stCondLst>
+                            <p:childTnLst>
+                              <p:par>
+                                <p:cTn id="15" presetID="10" presetClass="entr" presetSubtype="0" fill="hold" grpId="0" nodeType="clickEffect">
+                                  <p:stCondLst>
+                                    <p:cond delay="0"/>
+                                  </p:stCondLst>
+                                  <p:childTnLst>
+                                    <p:set>
+                                      <p:cBhvr>
+                                        <p:cTn id="16" dur="1" fill="hold">
+                                          <p:stCondLst>
+                                            <p:cond delay="0"/>
+                                          </p:stCondLst>
+                                        </p:cTn>
+                                        <p:tgtEl>
+                                          <p:spTgt spid="3">
+                                            <p:txEl>
+                                              <p:pRg st="2" end="2"/>
+                                            </p:txEl>
+                                          </p:spTgt>
+                                        </p:tgtEl>
+                                        <p:attrNameLst>
+                                          <p:attrName>style.visibility</p:attrName>
+                                        </p:attrNameLst>
+                                      </p:cBhvr>
+                                      <p:to>
+                                        <p:strVal val="visible"/>
+                                      </p:to>
+                                    </p:set>
+                                    <p:animEffect transition="in" filter="fade">
+                                      <p:cBhvr>
+                                        <p:cTn id="17" dur="500"/>
+                                        <p:tgtEl>
+                                          <p:spTgt spid="3">
+                                            <p:txEl>
+                                              <p:pRg st="2" end="2"/>
+                                            </p:txEl>
+                                          </p:spTgt>
+                                        </p:tgtEl>
+                                      </p:cBhvr>
+                                    </p:animEffect>
+                                  </p:childTnLst>
+                                </p:cTn>
+                              </p:par>
+                            </p:childTnLst>
+                          </p:cTn>
+                        </p:par>
+                      </p:childTnLst>
+                    </p:cTn>
+                  </p:par>
+                  <p:par>
+                    <p:cTn id="18" fill="hold">
+                      <p:stCondLst>
+                        <p:cond delay="indefinite"/>
+                      </p:stCondLst>
+                      <p:childTnLst>
+                        <p:par>
+                          <p:cTn id="19" fill="hold">
+                            <p:stCondLst>
+                              <p:cond delay="0"/>
+                            </p:stCondLst>
+                            <p:childTnLst>
+                              <p:par>
+                                <p:cTn id="20" presetID="10" presetClass="entr" presetSubtype="0" fill="hold" grpId="0" nodeType="clickEffect">
+                                  <p:stCondLst>
+                                    <p:cond delay="0"/>
+                                  </p:stCondLst>
+                                  <p:childTnLst>
+                                    <p:set>
+                                      <p:cBhvr>
+                                        <p:cTn id="21" dur="1" fill="hold">
+                                          <p:stCondLst>
+                                            <p:cond delay="0"/>
+                                          </p:stCondLst>
+                                        </p:cTn>
+                                        <p:tgtEl>
+                                          <p:spTgt spid="3">
+                                            <p:txEl>
+                                              <p:pRg st="3" end="3"/>
+                                            </p:txEl>
+                                          </p:spTgt>
+                                        </p:tgtEl>
+                                        <p:attrNameLst>
+                                          <p:attrName>style.visibility</p:attrName>
+                                        </p:attrNameLst>
+                                      </p:cBhvr>
+                                      <p:to>
+                                        <p:strVal val="visible"/>
+                                      </p:to>
+                                    </p:set>
+                                    <p:animEffect transition="in" filter="fade">
+                                      <p:cBhvr>
+                                        <p:cTn id="22" dur="500"/>
+                                        <p:tgtEl>
+                                          <p:spTgt spid="3">
+                                            <p:txEl>
+                                              <p:pRg st="3" end="3"/>
+                                            </p:txEl>
+                                          </p:spTgt>
+                                        </p:tgtEl>
+                                      </p:cBhvr>
+                                    </p:animEffect>
+                                  </p:childTnLst>
+                                </p:cTn>
+                              </p:par>
+                              <p:par>
+                                <p:cTn id="23" presetID="10" presetClass="entr" presetSubtype="0" fill="hold" grpId="0" nodeType="withEffect">
+                                  <p:stCondLst>
+                                    <p:cond delay="0"/>
+                                  </p:stCondLst>
+                                  <p:childTnLst>
+                                    <p:set>
+                                      <p:cBhvr>
+                                        <p:cTn id="24" dur="1" fill="hold">
+                                          <p:stCondLst>
+                                            <p:cond delay="0"/>
+                                          </p:stCondLst>
+                                        </p:cTn>
+                                        <p:tgtEl>
+                                          <p:spTgt spid="3">
+                                            <p:txEl>
+                                              <p:pRg st="4" end="4"/>
+                                            </p:txEl>
+                                          </p:spTgt>
+                                        </p:tgtEl>
+                                        <p:attrNameLst>
+                                          <p:attrName>style.visibility</p:attrName>
+                                        </p:attrNameLst>
+                                      </p:cBhvr>
+                                      <p:to>
+                                        <p:strVal val="visible"/>
+                                      </p:to>
+                                    </p:set>
+                                    <p:animEffect transition="in" filter="fade">
+                                      <p:cBhvr>
+                                        <p:cTn id="25" dur="500"/>
+                                        <p:tgtEl>
+                                          <p:spTgt spid="3">
+                                            <p:txEl>
+                                              <p:pRg st="4" end="4"/>
+                                            </p:txEl>
+                                          </p:spTgt>
+                                        </p:tgtEl>
+                                      </p:cBhvr>
+                                    </p:animEffect>
+                                  </p:childTnLst>
+                                </p:cTn>
+                              </p:par>
+                              <p:par>
+                                <p:cTn id="26" presetID="10" presetClass="entr" presetSubtype="0" fill="hold" grpId="0" nodeType="withEffect">
+                                  <p:stCondLst>
+                                    <p:cond delay="0"/>
+                                  </p:stCondLst>
+                                  <p:childTnLst>
+                                    <p:set>
+                                      <p:cBhvr>
+                                        <p:cTn id="27" dur="1" fill="hold">
+                                          <p:stCondLst>
+                                            <p:cond delay="0"/>
+                                          </p:stCondLst>
+                                        </p:cTn>
+                                        <p:tgtEl>
+                                          <p:spTgt spid="3">
+                                            <p:txEl>
+                                              <p:pRg st="5" end="5"/>
+                                            </p:txEl>
+                                          </p:spTgt>
+                                        </p:tgtEl>
+                                        <p:attrNameLst>
+                                          <p:attrName>style.visibility</p:attrName>
+                                        </p:attrNameLst>
+                                      </p:cBhvr>
+                                      <p:to>
+                                        <p:strVal val="visible"/>
+                                      </p:to>
+                                    </p:set>
+                                    <p:animEffect transition="in" filter="fade">
+                                      <p:cBhvr>
+                                        <p:cTn id="28" dur="500"/>
+                                        <p:tgtEl>
+                                          <p:spTgt spid="3">
+                                            <p:txEl>
+                                              <p:pRg st="5" end="5"/>
+                                            </p:txEl>
+                                          </p:spTgt>
+                                        </p:tgtEl>
+                                      </p:cBhvr>
+                                    </p:animEffect>
+                                  </p:childTnLst>
+                                </p:cTn>
+                              </p:par>
+                            </p:childTnLst>
+                          </p:cTn>
+                        </p:par>
+                      </p:childTnLst>
+                    </p:cTn>
+                  </p:par>
+                  <p:par>
+                    <p:cTn id="29" fill="hold">
+                      <p:stCondLst>
+                        <p:cond delay="indefinite"/>
+                      </p:stCondLst>
+                      <p:childTnLst>
+                        <p:par>
+                          <p:cTn id="30" fill="hold">
+                            <p:stCondLst>
+                              <p:cond delay="0"/>
+                            </p:stCondLst>
+                            <p:childTnLst>
+                              <p:par>
+                                <p:cTn id="31" presetID="10" presetClass="entr" presetSubtype="0" fill="hold" grpId="0" nodeType="clickEffect">
+                                  <p:stCondLst>
+                                    <p:cond delay="0"/>
+                                  </p:stCondLst>
+                                  <p:childTnLst>
+                                    <p:set>
+                                      <p:cBhvr>
+                                        <p:cTn id="32" dur="1" fill="hold">
+                                          <p:stCondLst>
+                                            <p:cond delay="0"/>
+                                          </p:stCondLst>
+                                        </p:cTn>
+                                        <p:tgtEl>
+                                          <p:spTgt spid="3">
+                                            <p:txEl>
+                                              <p:pRg st="7" end="7"/>
+                                            </p:txEl>
+                                          </p:spTgt>
+                                        </p:tgtEl>
+                                        <p:attrNameLst>
+                                          <p:attrName>style.visibility</p:attrName>
+                                        </p:attrNameLst>
+                                      </p:cBhvr>
+                                      <p:to>
+                                        <p:strVal val="visible"/>
+                                      </p:to>
+                                    </p:set>
+                                    <p:animEffect transition="in" filter="fade">
+                                      <p:cBhvr>
+                                        <p:cTn id="33" dur="500"/>
+                                        <p:tgtEl>
+                                          <p:spTgt spid="3">
+                                            <p:txEl>
+                                              <p:pRg st="7" end="7"/>
+                                            </p:txEl>
+                                          </p:spTgt>
+                                        </p:tgtEl>
+                                      </p:cBhvr>
+                                    </p:animEffect>
+                                  </p:childTnLst>
+                                </p:cTn>
+                              </p:par>
+                            </p:childTnLst>
+                          </p:cTn>
+                        </p:par>
+                      </p:childTnLst>
+                    </p:cTn>
+                  </p:par>
+                </p:childTnLst>
+              </p:cTn>
+              <p:prevCondLst>
+                <p:cond evt="onPrev" delay="0">
+                  <p:tgtEl>
+                    <p:sldTgt/>
+                  </p:tgtEl>
+                </p:cond>
+              </p:prevCondLst>
+              <p:nextCondLst>
+                <p:cond evt="onNext" delay="0">
+                  <p:tgtEl>
+                    <p:sldTgt/>
+                  </p:tgtEl>
+                </p:cond>
+              </p:nextCondLst>
+            </p:seq>
+          </p:childTnLst>
+        </p:cTn>
+      </p:par>
+    </p:tnLst>
+    <p:bldLst>
+      <p:bldP spid="3" grpId="0" build="p"/>
+    </p:bldLst>
+  </p:timing>
+</p:sld>
+</file>
+
+<file path=ppt/slides/slide11.xml><?xml version="1.0" encoding="utf-8"?>
+<p:sld xmlns:a="http://schemas.openxmlformats.org/drawingml/2006/main" xmlns:r="http://schemas.openxmlformats.org/officeDocument/2006/relationships" xmlns:p="http://schemas.openxmlformats.org/presentationml/2006/main">
+  <p:cSld>
+    <p:spTree>
+      <p:nvGrpSpPr>
+        <p:cNvPr id="1" name=""/>
+        <p:cNvGrpSpPr/>
+        <p:nvPr/>
+      </p:nvGrpSpPr>
+      <p:grpSpPr>
+        <a:xfrm>
+          <a:off x="0" y="0"/>
+          <a:ext cx="0" cy="0"/>
+          <a:chOff x="0" y="0"/>
+          <a:chExt cx="0" cy="0"/>
+        </a:xfrm>
+      </p:grpSpPr>
+      <p:sp>
+        <p:nvSpPr>
+          <p:cNvPr id="4" name="Title 3"/>
+          <p:cNvSpPr>
+            <a:spLocks noGrp="1"/>
+          </p:cNvSpPr>
+          <p:nvPr>
+            <p:ph type="title"/>
+          </p:nvPr>
+        </p:nvSpPr>
+        <p:spPr>
+          <a:xfrm>
+            <a:off x="1484310" y="771526"/>
+            <a:ext cx="10018713" cy="771524"/>
+          </a:xfrm>
+        </p:spPr>
+        <p:txBody>
+          <a:bodyPr>
+            <a:normAutofit/>
+          </a:bodyPr>
+          <a:lstStyle/>
+          <a:p>
+            <a:r>
+              <a:rPr lang="en-US" dirty="0" smtClean="0"/>
+              <a:t>Let’s Get </a:t>
+            </a:r>
+            <a:r>
+              <a:rPr lang="en-US" dirty="0" err="1" smtClean="0"/>
+              <a:t>v.Next</a:t>
+            </a:r>
+            <a:r>
+              <a:rPr lang="en-US" dirty="0" smtClean="0"/>
+              <a:t> (and other things)</a:t>
+            </a:r>
+            <a:endParaRPr lang="en-US" dirty="0"/>
+          </a:p>
+        </p:txBody>
+      </p:sp>
+      <p:sp>
+        <p:nvSpPr>
+          <p:cNvPr id="5" name="Content Placeholder 4"/>
+          <p:cNvSpPr>
+            <a:spLocks noGrp="1"/>
+          </p:cNvSpPr>
+          <p:nvPr>
+            <p:ph sz="half" idx="1"/>
+          </p:nvPr>
+        </p:nvSpPr>
+        <p:spPr>
+          <a:xfrm>
+            <a:off x="1484312" y="1857375"/>
+            <a:ext cx="4895055" cy="3933825"/>
+          </a:xfrm>
+        </p:spPr>
+        <p:txBody>
+          <a:bodyPr anchor="t"/>
+          <a:lstStyle/>
+          <a:p>
+            <a:pPr marL="0" indent="0">
+              <a:buNone/>
+            </a:pPr>
+            <a:r>
+              <a:rPr lang="en-US" b="1" dirty="0" smtClean="0"/>
+              <a:t>ASP.NET </a:t>
+            </a:r>
+            <a:r>
+              <a:rPr lang="en-US" b="1" dirty="0" err="1" smtClean="0"/>
+              <a:t>v.Next</a:t>
+            </a:r>
+            <a:r>
+              <a:rPr lang="en-US" b="1" dirty="0" smtClean="0"/>
+              <a:t> Runtimes:</a:t>
+            </a:r>
+          </a:p>
+          <a:p>
+            <a:r>
+              <a:rPr lang="en-US" dirty="0" smtClean="0"/>
+              <a:t>http://github.com/aspnet/home</a:t>
+            </a:r>
+          </a:p>
+          <a:p>
+            <a:pPr lvl="1"/>
+            <a:r>
+              <a:rPr lang="en-US" dirty="0" smtClean="0"/>
+              <a:t>Follow the directions for your operating system (Windows is preferred, but use OSX if you’d like)</a:t>
+            </a:r>
+          </a:p>
+          <a:p>
+            <a:pPr lvl="1"/>
+            <a:r>
+              <a:rPr lang="en-US" dirty="0" smtClean="0"/>
+              <a:t>This will install the K Version Manager</a:t>
+            </a:r>
+          </a:p>
+          <a:p>
+            <a:r>
+              <a:rPr lang="en-US" dirty="0" err="1" smtClean="0"/>
+              <a:t>kvm</a:t>
+            </a:r>
+            <a:r>
+              <a:rPr lang="en-US" dirty="0" smtClean="0"/>
+              <a:t> install latest</a:t>
+            </a:r>
+          </a:p>
+          <a:p>
+            <a:endParaRPr lang="en-US" dirty="0" smtClean="0"/>
+          </a:p>
+          <a:p>
+            <a:pPr marL="0" indent="0">
+              <a:buNone/>
+            </a:pPr>
+            <a:r>
+              <a:rPr lang="en-US" dirty="0" smtClean="0"/>
+              <a:t>We won’t be using Visual Studio (weird, right?) – but you </a:t>
+            </a:r>
+            <a:r>
+              <a:rPr lang="en-US" i="1" dirty="0" smtClean="0"/>
+              <a:t>can</a:t>
+            </a:r>
+            <a:r>
+              <a:rPr lang="en-US" dirty="0" smtClean="0"/>
+              <a:t> – Visual Studio 2014 CTP 3 is out.</a:t>
+            </a:r>
+          </a:p>
+        </p:txBody>
+      </p:sp>
+      <p:sp>
+        <p:nvSpPr>
+          <p:cNvPr id="6" name="Content Placeholder 5"/>
+          <p:cNvSpPr>
+            <a:spLocks noGrp="1"/>
+          </p:cNvSpPr>
+          <p:nvPr>
+            <p:ph sz="half" idx="2"/>
+          </p:nvPr>
+        </p:nvSpPr>
+        <p:spPr>
+          <a:xfrm>
+            <a:off x="6607967" y="1857375"/>
+            <a:ext cx="4895056" cy="5000625"/>
+          </a:xfrm>
+        </p:spPr>
+        <p:txBody>
+          <a:bodyPr anchor="t"/>
+          <a:lstStyle/>
+          <a:p>
+            <a:pPr marL="0" indent="0">
+              <a:buNone/>
+            </a:pPr>
+            <a:r>
+              <a:rPr lang="en-US" b="1" dirty="0" smtClean="0"/>
+              <a:t>Other Stuff We’ll Use</a:t>
+            </a:r>
+          </a:p>
+          <a:p>
+            <a:r>
+              <a:rPr lang="en-US" dirty="0" smtClean="0"/>
+              <a:t>Sublime </a:t>
+            </a:r>
+            <a:r>
+              <a:rPr lang="en-US" dirty="0"/>
+              <a:t>Text 3: </a:t>
+            </a:r>
+          </a:p>
+          <a:p>
+            <a:pPr lvl="1"/>
+            <a:r>
+              <a:rPr lang="en-US" dirty="0"/>
+              <a:t>http://www.sublimetext.com/3</a:t>
+            </a:r>
+          </a:p>
+          <a:p>
+            <a:r>
+              <a:rPr lang="en-US" dirty="0"/>
+              <a:t>Sublime Text Package Manager</a:t>
+            </a:r>
+          </a:p>
+          <a:p>
+            <a:pPr lvl="1"/>
+            <a:r>
+              <a:rPr lang="en-US" dirty="0"/>
+              <a:t>https://sublime.wbond.net/installation</a:t>
+            </a:r>
+          </a:p>
+          <a:p>
+            <a:r>
+              <a:rPr lang="en-US" dirty="0" err="1"/>
+              <a:t>Kulture</a:t>
+            </a:r>
+            <a:r>
+              <a:rPr lang="en-US" dirty="0"/>
+              <a:t> plugin for Sublime </a:t>
+            </a:r>
+            <a:r>
+              <a:rPr lang="en-US" dirty="0" smtClean="0"/>
+              <a:t>Text</a:t>
+            </a:r>
+          </a:p>
+          <a:p>
+            <a:r>
+              <a:rPr lang="en-US" dirty="0"/>
+              <a:t>node.js (and </a:t>
+            </a:r>
+            <a:r>
+              <a:rPr lang="en-US" dirty="0" err="1"/>
+              <a:t>npm</a:t>
+            </a:r>
+            <a:r>
+              <a:rPr lang="en-US" dirty="0"/>
+              <a:t>): </a:t>
+            </a:r>
+          </a:p>
+          <a:p>
+            <a:pPr lvl="1"/>
+            <a:r>
+              <a:rPr lang="en-US" dirty="0"/>
+              <a:t>http://</a:t>
+            </a:r>
+            <a:r>
+              <a:rPr lang="en-US" dirty="0" smtClean="0"/>
+              <a:t>nodejs.org</a:t>
+            </a:r>
+            <a:endParaRPr lang="en-US" dirty="0"/>
+          </a:p>
+          <a:p>
+            <a:r>
+              <a:rPr lang="en-US" dirty="0" smtClean="0"/>
+              <a:t>Yeoman</a:t>
+            </a:r>
+          </a:p>
+          <a:p>
+            <a:pPr lvl="1"/>
+            <a:r>
+              <a:rPr lang="en-US" dirty="0" err="1"/>
+              <a:t>npm</a:t>
+            </a:r>
+            <a:r>
+              <a:rPr lang="en-US" dirty="0"/>
+              <a:t> install -g </a:t>
+            </a:r>
+            <a:r>
+              <a:rPr lang="en-US" dirty="0" err="1"/>
+              <a:t>yo</a:t>
+            </a:r>
+            <a:endParaRPr lang="en-US" dirty="0"/>
+          </a:p>
+          <a:p>
+            <a:pPr lvl="1"/>
+            <a:r>
+              <a:rPr lang="en-US" dirty="0" err="1"/>
+              <a:t>npm</a:t>
+            </a:r>
+            <a:r>
+              <a:rPr lang="en-US" dirty="0"/>
+              <a:t> install -g generator-</a:t>
+            </a:r>
+            <a:r>
+              <a:rPr lang="en-US" dirty="0" err="1"/>
+              <a:t>aspnet</a:t>
+            </a:r>
+            <a:endParaRPr lang="en-US" dirty="0"/>
+          </a:p>
+        </p:txBody>
+      </p:sp>
+    </p:spTree>
+    <p:extLst>
+      <p:ext uri="{BB962C8B-B14F-4D97-AF65-F5344CB8AC3E}">
+        <p14:creationId xmlns:p14="http://schemas.microsoft.com/office/powerpoint/2010/main" val="2330937789"/>
+      </p:ext>
+    </p:extLst>
+  </p:cSld>
+  <p:clrMapOvr>
+    <a:masterClrMapping/>
+  </p:clrMapOvr>
+  <mc:AlternateContent xmlns:mc="http://schemas.openxmlformats.org/markup-compatibility/2006">
+    <mc:Choice xmlns:p14="http://schemas.microsoft.com/office/powerpoint/2010/main" Requires="p14">
+      <p:transition spd="slow">
+        <p14:glitter pattern="hexagon"/>
+      </p:transition>
+    </mc:Choice>
+    <mc:Fallback>
+      <p:transition spd="slow">
+        <p:fade/>
+      </p:transition>
+    </mc:Fallback>
+  </mc:AlternateContent>
+  <p:timing>
+    <p:tnLst>
+      <p:par>
+        <p:cTn id="1" dur="indefinite" restart="never" nodeType="tmRoot"/>
+      </p:par>
+    </p:tnLst>
+  </p:timing>
+</p:sld>
+</file>
+
+<file path=ppt/slides/slide12.xml><?xml version="1.0" encoding="utf-8"?>
+<p:sld xmlns:a="http://schemas.openxmlformats.org/drawingml/2006/main" xmlns:r="http://schemas.openxmlformats.org/officeDocument/2006/relationships" xmlns:p="http://schemas.openxmlformats.org/presentationml/2006/main">
+  <p:cSld>
+    <p:spTree>
+      <p:nvGrpSpPr>
+        <p:cNvPr id="1" name=""/>
+        <p:cNvGrpSpPr/>
+        <p:nvPr/>
+      </p:nvGrpSpPr>
+      <p:grpSpPr>
+        <a:xfrm>
+          <a:off x="0" y="0"/>
+          <a:ext cx="0" cy="0"/>
+          <a:chOff x="0" y="0"/>
+          <a:chExt cx="0" cy="0"/>
+        </a:xfrm>
+      </p:grpSpPr>
+      <p:sp>
+        <p:nvSpPr>
+          <p:cNvPr id="2" name="Title 1"/>
+          <p:cNvSpPr>
+            <a:spLocks noGrp="1"/>
+          </p:cNvSpPr>
+          <p:nvPr>
+            <p:ph type="title"/>
+          </p:nvPr>
+        </p:nvSpPr>
+        <p:spPr/>
+        <p:txBody>
+          <a:bodyPr/>
+          <a:lstStyle/>
+          <a:p>
+            <a:r>
+              <a:rPr lang="en-US" dirty="0" smtClean="0"/>
+              <a:t>LET’S CODE!</a:t>
             </a:r>
             <a:endParaRPr lang="en-US" dirty="0"/>
           </a:p>
@@ -6504,7 +8982,7 @@
 </p:sld>
 </file>
 
-<file path=ppt/slides/slide11.xml><?xml version="1.0" encoding="utf-8"?>
+<file path=ppt/slides/slide13.xml><?xml version="1.0" encoding="utf-8"?>
 <p:sld xmlns:a="http://schemas.openxmlformats.org/drawingml/2006/main" xmlns:r="http://schemas.openxmlformats.org/officeDocument/2006/relationships" xmlns:p="http://schemas.openxmlformats.org/presentationml/2006/main">
   <p:cSld>
     <p:spTree>
@@ -6523,6 +9001,353 @@
       </p:grpSpPr>
       <p:sp>
         <p:nvSpPr>
+          <p:cNvPr id="5" name="Title 4"/>
+          <p:cNvSpPr>
+            <a:spLocks noGrp="1"/>
+          </p:cNvSpPr>
+          <p:nvPr>
+            <p:ph type="title"/>
+          </p:nvPr>
+        </p:nvSpPr>
+        <p:spPr>
+          <a:xfrm>
+            <a:off x="1398586" y="121444"/>
+            <a:ext cx="10018713" cy="750094"/>
+          </a:xfrm>
+        </p:spPr>
+        <p:txBody>
+          <a:bodyPr/>
+          <a:lstStyle/>
+          <a:p>
+            <a:r>
+              <a:rPr lang="en-US" dirty="0" smtClean="0"/>
+              <a:t>Your Turn to Build Something</a:t>
+            </a:r>
+            <a:endParaRPr lang="en-US" dirty="0"/>
+          </a:p>
+        </p:txBody>
+      </p:sp>
+      <p:sp>
+        <p:nvSpPr>
+          <p:cNvPr id="6" name="Content Placeholder 5"/>
+          <p:cNvSpPr>
+            <a:spLocks noGrp="1"/>
+          </p:cNvSpPr>
+          <p:nvPr>
+            <p:ph idx="1"/>
+          </p:nvPr>
+        </p:nvSpPr>
+        <p:spPr>
+          <a:xfrm>
+            <a:off x="1484310" y="957264"/>
+            <a:ext cx="10018713" cy="5314949"/>
+          </a:xfrm>
+        </p:spPr>
+        <p:txBody>
+          <a:bodyPr>
+            <a:normAutofit fontScale="92500" lnSpcReduction="10000"/>
+          </a:bodyPr>
+          <a:lstStyle/>
+          <a:p>
+            <a:pPr marL="0" indent="0">
+              <a:buNone/>
+            </a:pPr>
+            <a:r>
+              <a:rPr lang="en-US" dirty="0" smtClean="0"/>
+              <a:t>Build an MVC-based messaging app (or whatever!)</a:t>
+            </a:r>
+          </a:p>
+          <a:p>
+            <a:r>
+              <a:rPr lang="en-US" dirty="0" smtClean="0"/>
+              <a:t>Users enter name and message, display conversation</a:t>
+            </a:r>
+          </a:p>
+          <a:p>
+            <a:pPr lvl="1"/>
+            <a:r>
+              <a:rPr lang="en-US" dirty="0" smtClean="0"/>
+              <a:t>Will need Entity Framework (and a data store – </a:t>
+            </a:r>
+            <a:r>
+              <a:rPr lang="en-US" dirty="0" err="1" smtClean="0"/>
+              <a:t>SQLExpress</a:t>
+            </a:r>
+            <a:r>
+              <a:rPr lang="en-US" dirty="0" smtClean="0"/>
+              <a:t>/</a:t>
+            </a:r>
+            <a:r>
+              <a:rPr lang="en-US" dirty="0" err="1" smtClean="0"/>
+              <a:t>LocalDB</a:t>
+            </a:r>
+            <a:r>
+              <a:rPr lang="en-US" dirty="0" smtClean="0"/>
+              <a:t>)</a:t>
+            </a:r>
+          </a:p>
+          <a:p>
+            <a:r>
+              <a:rPr lang="en-US" dirty="0" smtClean="0"/>
+              <a:t>Now add ASP.NET Identity</a:t>
+            </a:r>
+          </a:p>
+          <a:p>
+            <a:pPr lvl="1"/>
+            <a:r>
+              <a:rPr lang="en-US" dirty="0" smtClean="0"/>
+              <a:t>This is a lot – copy the files related to identity from my demo or online</a:t>
+            </a:r>
+          </a:p>
+          <a:p>
+            <a:r>
+              <a:rPr lang="en-US" dirty="0" smtClean="0"/>
+              <a:t>Change default routing for MVC</a:t>
+            </a:r>
+          </a:p>
+          <a:p>
+            <a:r>
+              <a:rPr lang="en-US" dirty="0" smtClean="0"/>
+              <a:t>Make a Messages API (try using the existing controller!)</a:t>
+            </a:r>
+          </a:p>
+          <a:p>
+            <a:r>
+              <a:rPr lang="en-US" dirty="0" smtClean="0"/>
+              <a:t>Add some logging Middleware</a:t>
+            </a:r>
+          </a:p>
+          <a:p>
+            <a:r>
+              <a:rPr lang="en-US" i="1" dirty="0" smtClean="0">
+                <a:solidFill>
+                  <a:schemeClr val="accent1">
+                    <a:lumMod val="75000"/>
+                  </a:schemeClr>
+                </a:solidFill>
+              </a:rPr>
+              <a:t>Use </a:t>
+            </a:r>
+            <a:r>
+              <a:rPr lang="en-US" i="1" dirty="0" err="1" smtClean="0">
+                <a:solidFill>
+                  <a:schemeClr val="accent1">
+                    <a:lumMod val="75000"/>
+                  </a:schemeClr>
+                </a:solidFill>
+              </a:rPr>
+              <a:t>Autofac</a:t>
+            </a:r>
+            <a:r>
+              <a:rPr lang="en-US" i="1" dirty="0" smtClean="0">
+                <a:solidFill>
+                  <a:schemeClr val="accent1">
+                    <a:lumMod val="75000"/>
+                  </a:schemeClr>
+                </a:solidFill>
+              </a:rPr>
+              <a:t> for Dependency Injection</a:t>
+            </a:r>
+          </a:p>
+          <a:p>
+            <a:r>
+              <a:rPr lang="en-US" i="1" dirty="0" smtClean="0">
+                <a:solidFill>
+                  <a:schemeClr val="accent1">
+                    <a:lumMod val="75000"/>
+                  </a:schemeClr>
+                </a:solidFill>
+              </a:rPr>
+              <a:t>Use some C# 6 (</a:t>
+            </a:r>
+            <a:r>
+              <a:rPr lang="en-US" i="1" dirty="0" err="1" smtClean="0">
+                <a:solidFill>
+                  <a:schemeClr val="accent1">
+                    <a:lumMod val="75000"/>
+                  </a:schemeClr>
+                </a:solidFill>
+              </a:rPr>
+              <a:t>v.Next</a:t>
+            </a:r>
+            <a:r>
+              <a:rPr lang="en-US" i="1" dirty="0" smtClean="0">
+                <a:solidFill>
+                  <a:schemeClr val="accent1">
+                    <a:lumMod val="75000"/>
+                  </a:schemeClr>
+                </a:solidFill>
+              </a:rPr>
+              <a:t>) language features – Roslyn!</a:t>
+            </a:r>
+          </a:p>
+          <a:p>
+            <a:r>
+              <a:rPr lang="en-US" i="1" dirty="0" smtClean="0">
+                <a:solidFill>
+                  <a:schemeClr val="accent1">
+                    <a:lumMod val="75000"/>
+                  </a:schemeClr>
+                </a:solidFill>
+              </a:rPr>
+              <a:t>Use </a:t>
+            </a:r>
+            <a:r>
+              <a:rPr lang="en-US" i="1" dirty="0" err="1" smtClean="0">
+                <a:solidFill>
+                  <a:schemeClr val="accent1">
+                    <a:lumMod val="75000"/>
+                  </a:schemeClr>
+                </a:solidFill>
+              </a:rPr>
+              <a:t>SignalR</a:t>
+            </a:r>
+            <a:r>
+              <a:rPr lang="en-US" i="1" dirty="0" smtClean="0">
+                <a:solidFill>
+                  <a:schemeClr val="accent1">
+                    <a:lumMod val="75000"/>
+                  </a:schemeClr>
+                </a:solidFill>
+              </a:rPr>
+              <a:t> to provide real-time updates of conversation</a:t>
+            </a:r>
+          </a:p>
+          <a:p>
+            <a:r>
+              <a:rPr lang="en-US" i="1" dirty="0">
+                <a:solidFill>
+                  <a:schemeClr val="accent1">
+                    <a:lumMod val="75000"/>
+                  </a:schemeClr>
+                </a:solidFill>
+              </a:rPr>
+              <a:t>Make </a:t>
+            </a:r>
+            <a:r>
+              <a:rPr lang="en-US" i="1" dirty="0" err="1">
+                <a:solidFill>
+                  <a:schemeClr val="accent1">
+                    <a:lumMod val="75000"/>
+                  </a:schemeClr>
+                </a:solidFill>
+              </a:rPr>
+              <a:t>MessagesController</a:t>
+            </a:r>
+            <a:r>
+              <a:rPr lang="en-US" i="1" dirty="0">
+                <a:solidFill>
+                  <a:schemeClr val="accent1">
+                    <a:lumMod val="75000"/>
+                  </a:schemeClr>
+                </a:solidFill>
+              </a:rPr>
+              <a:t> a POCO </a:t>
+            </a:r>
+            <a:r>
+              <a:rPr lang="en-US" i="1" dirty="0" smtClean="0">
+                <a:solidFill>
+                  <a:schemeClr val="accent1">
+                    <a:lumMod val="75000"/>
+                  </a:schemeClr>
+                </a:solidFill>
+              </a:rPr>
+              <a:t>controller</a:t>
+            </a:r>
+            <a:endParaRPr lang="en-US" i="1" dirty="0">
+              <a:solidFill>
+                <a:schemeClr val="accent1">
+                  <a:lumMod val="75000"/>
+                </a:schemeClr>
+              </a:solidFill>
+            </a:endParaRPr>
+          </a:p>
+        </p:txBody>
+      </p:sp>
+      <p:sp>
+        <p:nvSpPr>
+          <p:cNvPr id="7" name="TextBox 6"/>
+          <p:cNvSpPr txBox="1"/>
+          <p:nvPr/>
+        </p:nvSpPr>
+        <p:spPr>
+          <a:xfrm>
+            <a:off x="3236119" y="6357939"/>
+            <a:ext cx="10206037" cy="400110"/>
+          </a:xfrm>
+          <a:prstGeom prst="rect">
+            <a:avLst/>
+          </a:prstGeom>
+          <a:noFill/>
+        </p:spPr>
+        <p:txBody>
+          <a:bodyPr wrap="square" rtlCol="0">
+            <a:spAutoFit/>
+          </a:bodyPr>
+          <a:lstStyle/>
+          <a:p>
+            <a:r>
+              <a:rPr lang="en-US" sz="2000" b="1" dirty="0" smtClean="0"/>
+              <a:t>Demo Reference</a:t>
+            </a:r>
+            <a:r>
+              <a:rPr lang="en-US" sz="2000" b="1" dirty="0"/>
+              <a:t>: https://github.com/cabarney/AspNetvNextDemo</a:t>
+            </a:r>
+          </a:p>
+        </p:txBody>
+      </p:sp>
+    </p:spTree>
+    <p:extLst>
+      <p:ext uri="{BB962C8B-B14F-4D97-AF65-F5344CB8AC3E}">
+        <p14:creationId xmlns:p14="http://schemas.microsoft.com/office/powerpoint/2010/main" val="736687025"/>
+      </p:ext>
+    </p:extLst>
+  </p:cSld>
+  <p:clrMapOvr>
+    <a:masterClrMapping/>
+  </p:clrMapOvr>
+  <mc:AlternateContent xmlns:mc="http://schemas.openxmlformats.org/markup-compatibility/2006">
+    <mc:Choice xmlns:p14="http://schemas.microsoft.com/office/powerpoint/2010/main" Requires="p14">
+      <p:transition spd="slow">
+        <p14:glitter pattern="hexagon"/>
+      </p:transition>
+    </mc:Choice>
+    <mc:Fallback>
+      <p:transition spd="slow">
+        <p:fade/>
+      </p:transition>
+    </mc:Fallback>
+  </mc:AlternateContent>
+  <p:timing>
+    <p:tnLst>
+      <p:par>
+        <p:cTn id="1" dur="indefinite" restart="never" nodeType="tmRoot"/>
+      </p:par>
+    </p:tnLst>
+  </p:timing>
+</p:sld>
+</file>
+
+<file path=ppt/slides/slide14.xml><?xml version="1.0" encoding="utf-8"?>
+<p:sld xmlns:a="http://schemas.openxmlformats.org/drawingml/2006/main" xmlns:r="http://schemas.openxmlformats.org/officeDocument/2006/relationships" xmlns:p="http://schemas.openxmlformats.org/presentationml/2006/main">
+  <p:cSld>
+    <p:spTree>
+      <p:nvGrpSpPr>
+        <p:cNvPr id="1" name=""/>
+        <p:cNvGrpSpPr/>
+        <p:nvPr/>
+      </p:nvGrpSpPr>
+      <p:grpSpPr>
+        <a:xfrm>
+          <a:off x="0" y="0"/>
+          <a:ext cx="0" cy="0"/>
+          <a:chOff x="0" y="0"/>
+          <a:chExt cx="0" cy="0"/>
+        </a:xfrm>
+      </p:grpSpPr>
+      <p:sp>
+        <p:nvSpPr>
           <p:cNvPr id="4" name="Title 3"/>
           <p:cNvSpPr>
             <a:spLocks noGrp="1"/>
@@ -6635,13 +9460,13 @@
   <p:clrMapOvr>
     <a:masterClrMapping/>
   </p:clrMapOvr>
-  <mc:AlternateContent xmlns:mc="http://schemas.openxmlformats.org/markup-compatibility/2006" xmlns:p14="http://schemas.microsoft.com/office/powerpoint/2010/main">
-    <mc:Choice Requires="p14">
+  <mc:AlternateContent xmlns:mc="http://schemas.openxmlformats.org/markup-compatibility/2006">
+    <mc:Choice xmlns:p14="http://schemas.microsoft.com/office/powerpoint/2010/main" Requires="p14">
       <p:transition spd="slow">
         <p14:glitter pattern="hexagon"/>
       </p:transition>
     </mc:Choice>
-    <mc:Fallback xmlns="">
+    <mc:Fallback>
       <p:transition spd="slow">
         <p:fade/>
       </p:transition>
@@ -6801,6 +9626,729 @@
 </file>
 
 <file path=ppt/slides/slide3.xml><?xml version="1.0" encoding="utf-8"?>
+<p:sld xmlns:a="http://schemas.openxmlformats.org/drawingml/2006/main" xmlns:r="http://schemas.openxmlformats.org/officeDocument/2006/relationships" xmlns:p="http://schemas.openxmlformats.org/presentationml/2006/main">
+  <p:cSld>
+    <p:spTree>
+      <p:nvGrpSpPr>
+        <p:cNvPr id="1" name=""/>
+        <p:cNvGrpSpPr/>
+        <p:nvPr/>
+      </p:nvGrpSpPr>
+      <p:grpSpPr>
+        <a:xfrm>
+          <a:off x="0" y="0"/>
+          <a:ext cx="0" cy="0"/>
+          <a:chOff x="0" y="0"/>
+          <a:chExt cx="0" cy="0"/>
+        </a:xfrm>
+      </p:grpSpPr>
+      <p:sp>
+        <p:nvSpPr>
+          <p:cNvPr id="2" name="Title 1"/>
+          <p:cNvSpPr>
+            <a:spLocks noGrp="1"/>
+          </p:cNvSpPr>
+          <p:nvPr>
+            <p:ph type="title"/>
+          </p:nvPr>
+        </p:nvSpPr>
+        <p:spPr/>
+        <p:txBody>
+          <a:bodyPr/>
+          <a:lstStyle/>
+          <a:p>
+            <a:r>
+              <a:rPr lang="en-US" dirty="0" smtClean="0"/>
+              <a:t>Agenda</a:t>
+            </a:r>
+            <a:endParaRPr lang="en-US" dirty="0"/>
+          </a:p>
+        </p:txBody>
+      </p:sp>
+      <p:sp>
+        <p:nvSpPr>
+          <p:cNvPr id="3" name="Content Placeholder 2"/>
+          <p:cNvSpPr>
+            <a:spLocks noGrp="1"/>
+          </p:cNvSpPr>
+          <p:nvPr>
+            <p:ph idx="1"/>
+          </p:nvPr>
+        </p:nvSpPr>
+        <p:spPr/>
+        <p:txBody>
+          <a:bodyPr/>
+          <a:lstStyle/>
+          <a:p>
+            <a:r>
+              <a:rPr lang="en-US" dirty="0" smtClean="0"/>
+              <a:t>Me Talking</a:t>
+            </a:r>
+          </a:p>
+          <a:p>
+            <a:r>
+              <a:rPr lang="en-US" dirty="0" smtClean="0"/>
+              <a:t>Installing the tools and frameworks we need</a:t>
+            </a:r>
+          </a:p>
+          <a:p>
+            <a:r>
+              <a:rPr lang="en-US" dirty="0" smtClean="0"/>
+              <a:t>Me talking and coding (you can code with me)</a:t>
+            </a:r>
+          </a:p>
+          <a:p>
+            <a:r>
+              <a:rPr lang="en-US" dirty="0" smtClean="0"/>
+              <a:t>You coding (and I’ll come around and help)</a:t>
+            </a:r>
+          </a:p>
+          <a:p>
+            <a:endParaRPr lang="en-US" dirty="0"/>
+          </a:p>
+          <a:p>
+            <a:r>
+              <a:rPr lang="en-US" dirty="0" smtClean="0"/>
+              <a:t>No Visual Studio.  Seriously.</a:t>
+            </a:r>
+            <a:endParaRPr lang="en-US" dirty="0"/>
+          </a:p>
+        </p:txBody>
+      </p:sp>
+    </p:spTree>
+    <p:extLst>
+      <p:ext uri="{BB962C8B-B14F-4D97-AF65-F5344CB8AC3E}">
+        <p14:creationId xmlns:p14="http://schemas.microsoft.com/office/powerpoint/2010/main" val="2115625966"/>
+      </p:ext>
+    </p:extLst>
+  </p:cSld>
+  <p:clrMapOvr>
+    <a:masterClrMapping/>
+  </p:clrMapOvr>
+  <mc:AlternateContent xmlns:mc="http://schemas.openxmlformats.org/markup-compatibility/2006">
+    <mc:Choice xmlns:p14="http://schemas.microsoft.com/office/powerpoint/2010/main" Requires="p14">
+      <p:transition spd="slow">
+        <p14:glitter pattern="hexagon"/>
+      </p:transition>
+    </mc:Choice>
+    <mc:Fallback>
+      <p:transition spd="slow">
+        <p:fade/>
+      </p:transition>
+    </mc:Fallback>
+  </mc:AlternateContent>
+  <p:timing>
+    <p:tnLst>
+      <p:par>
+        <p:cTn id="1" dur="indefinite" restart="never" nodeType="tmRoot">
+          <p:childTnLst>
+            <p:seq concurrent="1" nextAc="seek">
+              <p:cTn id="2" dur="indefinite" nodeType="mainSeq">
+                <p:childTnLst>
+                  <p:par>
+                    <p:cTn id="3" fill="hold">
+                      <p:stCondLst>
+                        <p:cond delay="indefinite"/>
+                      </p:stCondLst>
+                      <p:childTnLst>
+                        <p:par>
+                          <p:cTn id="4" fill="hold">
+                            <p:stCondLst>
+                              <p:cond delay="0"/>
+                            </p:stCondLst>
+                            <p:childTnLst>
+                              <p:par>
+                                <p:cTn id="5" presetID="42" presetClass="entr" presetSubtype="0" fill="hold" grpId="0" nodeType="clickEffect">
+                                  <p:stCondLst>
+                                    <p:cond delay="0"/>
+                                  </p:stCondLst>
+                                  <p:childTnLst>
+                                    <p:set>
+                                      <p:cBhvr>
+                                        <p:cTn id="6" dur="1" fill="hold">
+                                          <p:stCondLst>
+                                            <p:cond delay="0"/>
+                                          </p:stCondLst>
+                                        </p:cTn>
+                                        <p:tgtEl>
+                                          <p:spTgt spid="3">
+                                            <p:txEl>
+                                              <p:pRg st="0" end="0"/>
+                                            </p:txEl>
+                                          </p:spTgt>
+                                        </p:tgtEl>
+                                        <p:attrNameLst>
+                                          <p:attrName>style.visibility</p:attrName>
+                                        </p:attrNameLst>
+                                      </p:cBhvr>
+                                      <p:to>
+                                        <p:strVal val="visible"/>
+                                      </p:to>
+                                    </p:set>
+                                    <p:animEffect transition="in" filter="fade">
+                                      <p:cBhvr>
+                                        <p:cTn id="7" dur="1000"/>
+                                        <p:tgtEl>
+                                          <p:spTgt spid="3">
+                                            <p:txEl>
+                                              <p:pRg st="0" end="0"/>
+                                            </p:txEl>
+                                          </p:spTgt>
+                                        </p:tgtEl>
+                                      </p:cBhvr>
+                                    </p:animEffect>
+                                    <p:anim calcmode="lin" valueType="num">
+                                      <p:cBhvr>
+                                        <p:cTn id="8" dur="1000" fill="hold"/>
+                                        <p:tgtEl>
+                                          <p:spTgt spid="3">
+                                            <p:txEl>
+                                              <p:pRg st="0" end="0"/>
+                                            </p:txEl>
+                                          </p:spTgt>
+                                        </p:tgtEl>
+                                        <p:attrNameLst>
+                                          <p:attrName>ppt_x</p:attrName>
+                                        </p:attrNameLst>
+                                      </p:cBhvr>
+                                      <p:tavLst>
+                                        <p:tav tm="0">
+                                          <p:val>
+                                            <p:strVal val="#ppt_x"/>
+                                          </p:val>
+                                        </p:tav>
+                                        <p:tav tm="100000">
+                                          <p:val>
+                                            <p:strVal val="#ppt_x"/>
+                                          </p:val>
+                                        </p:tav>
+                                      </p:tavLst>
+                                    </p:anim>
+                                    <p:anim calcmode="lin" valueType="num">
+                                      <p:cBhvr>
+                                        <p:cTn id="9" dur="1000" fill="hold"/>
+                                        <p:tgtEl>
+                                          <p:spTgt spid="3">
+                                            <p:txEl>
+                                              <p:pRg st="0" end="0"/>
+                                            </p:txEl>
+                                          </p:spTgt>
+                                        </p:tgtEl>
+                                        <p:attrNameLst>
+                                          <p:attrName>ppt_y</p:attrName>
+                                        </p:attrNameLst>
+                                      </p:cBhvr>
+                                      <p:tavLst>
+                                        <p:tav tm="0">
+                                          <p:val>
+                                            <p:strVal val="#ppt_y+.1"/>
+                                          </p:val>
+                                        </p:tav>
+                                        <p:tav tm="100000">
+                                          <p:val>
+                                            <p:strVal val="#ppt_y"/>
+                                          </p:val>
+                                        </p:tav>
+                                      </p:tavLst>
+                                    </p:anim>
+                                  </p:childTnLst>
+                                </p:cTn>
+                              </p:par>
+                            </p:childTnLst>
+                          </p:cTn>
+                        </p:par>
+                      </p:childTnLst>
+                    </p:cTn>
+                  </p:par>
+                  <p:par>
+                    <p:cTn id="10" fill="hold">
+                      <p:stCondLst>
+                        <p:cond delay="indefinite"/>
+                      </p:stCondLst>
+                      <p:childTnLst>
+                        <p:par>
+                          <p:cTn id="11" fill="hold">
+                            <p:stCondLst>
+                              <p:cond delay="0"/>
+                            </p:stCondLst>
+                            <p:childTnLst>
+                              <p:par>
+                                <p:cTn id="12" presetID="42" presetClass="entr" presetSubtype="0" fill="hold" grpId="0" nodeType="clickEffect">
+                                  <p:stCondLst>
+                                    <p:cond delay="0"/>
+                                  </p:stCondLst>
+                                  <p:childTnLst>
+                                    <p:set>
+                                      <p:cBhvr>
+                                        <p:cTn id="13" dur="1" fill="hold">
+                                          <p:stCondLst>
+                                            <p:cond delay="0"/>
+                                          </p:stCondLst>
+                                        </p:cTn>
+                                        <p:tgtEl>
+                                          <p:spTgt spid="3">
+                                            <p:txEl>
+                                              <p:pRg st="1" end="1"/>
+                                            </p:txEl>
+                                          </p:spTgt>
+                                        </p:tgtEl>
+                                        <p:attrNameLst>
+                                          <p:attrName>style.visibility</p:attrName>
+                                        </p:attrNameLst>
+                                      </p:cBhvr>
+                                      <p:to>
+                                        <p:strVal val="visible"/>
+                                      </p:to>
+                                    </p:set>
+                                    <p:animEffect transition="in" filter="fade">
+                                      <p:cBhvr>
+                                        <p:cTn id="14" dur="1000"/>
+                                        <p:tgtEl>
+                                          <p:spTgt spid="3">
+                                            <p:txEl>
+                                              <p:pRg st="1" end="1"/>
+                                            </p:txEl>
+                                          </p:spTgt>
+                                        </p:tgtEl>
+                                      </p:cBhvr>
+                                    </p:animEffect>
+                                    <p:anim calcmode="lin" valueType="num">
+                                      <p:cBhvr>
+                                        <p:cTn id="15" dur="1000" fill="hold"/>
+                                        <p:tgtEl>
+                                          <p:spTgt spid="3">
+                                            <p:txEl>
+                                              <p:pRg st="1" end="1"/>
+                                            </p:txEl>
+                                          </p:spTgt>
+                                        </p:tgtEl>
+                                        <p:attrNameLst>
+                                          <p:attrName>ppt_x</p:attrName>
+                                        </p:attrNameLst>
+                                      </p:cBhvr>
+                                      <p:tavLst>
+                                        <p:tav tm="0">
+                                          <p:val>
+                                            <p:strVal val="#ppt_x"/>
+                                          </p:val>
+                                        </p:tav>
+                                        <p:tav tm="100000">
+                                          <p:val>
+                                            <p:strVal val="#ppt_x"/>
+                                          </p:val>
+                                        </p:tav>
+                                      </p:tavLst>
+                                    </p:anim>
+                                    <p:anim calcmode="lin" valueType="num">
+                                      <p:cBhvr>
+                                        <p:cTn id="16" dur="1000" fill="hold"/>
+                                        <p:tgtEl>
+                                          <p:spTgt spid="3">
+                                            <p:txEl>
+                                              <p:pRg st="1" end="1"/>
+                                            </p:txEl>
+                                          </p:spTgt>
+                                        </p:tgtEl>
+                                        <p:attrNameLst>
+                                          <p:attrName>ppt_y</p:attrName>
+                                        </p:attrNameLst>
+                                      </p:cBhvr>
+                                      <p:tavLst>
+                                        <p:tav tm="0">
+                                          <p:val>
+                                            <p:strVal val="#ppt_y+.1"/>
+                                          </p:val>
+                                        </p:tav>
+                                        <p:tav tm="100000">
+                                          <p:val>
+                                            <p:strVal val="#ppt_y"/>
+                                          </p:val>
+                                        </p:tav>
+                                      </p:tavLst>
+                                    </p:anim>
+                                  </p:childTnLst>
+                                </p:cTn>
+                              </p:par>
+                            </p:childTnLst>
+                          </p:cTn>
+                        </p:par>
+                      </p:childTnLst>
+                    </p:cTn>
+                  </p:par>
+                  <p:par>
+                    <p:cTn id="17" fill="hold">
+                      <p:stCondLst>
+                        <p:cond delay="indefinite"/>
+                      </p:stCondLst>
+                      <p:childTnLst>
+                        <p:par>
+                          <p:cTn id="18" fill="hold">
+                            <p:stCondLst>
+                              <p:cond delay="0"/>
+                            </p:stCondLst>
+                            <p:childTnLst>
+                              <p:par>
+                                <p:cTn id="19" presetID="42" presetClass="entr" presetSubtype="0" fill="hold" grpId="0" nodeType="clickEffect">
+                                  <p:stCondLst>
+                                    <p:cond delay="0"/>
+                                  </p:stCondLst>
+                                  <p:childTnLst>
+                                    <p:set>
+                                      <p:cBhvr>
+                                        <p:cTn id="20" dur="1" fill="hold">
+                                          <p:stCondLst>
+                                            <p:cond delay="0"/>
+                                          </p:stCondLst>
+                                        </p:cTn>
+                                        <p:tgtEl>
+                                          <p:spTgt spid="3">
+                                            <p:txEl>
+                                              <p:pRg st="2" end="2"/>
+                                            </p:txEl>
+                                          </p:spTgt>
+                                        </p:tgtEl>
+                                        <p:attrNameLst>
+                                          <p:attrName>style.visibility</p:attrName>
+                                        </p:attrNameLst>
+                                      </p:cBhvr>
+                                      <p:to>
+                                        <p:strVal val="visible"/>
+                                      </p:to>
+                                    </p:set>
+                                    <p:animEffect transition="in" filter="fade">
+                                      <p:cBhvr>
+                                        <p:cTn id="21" dur="1000"/>
+                                        <p:tgtEl>
+                                          <p:spTgt spid="3">
+                                            <p:txEl>
+                                              <p:pRg st="2" end="2"/>
+                                            </p:txEl>
+                                          </p:spTgt>
+                                        </p:tgtEl>
+                                      </p:cBhvr>
+                                    </p:animEffect>
+                                    <p:anim calcmode="lin" valueType="num">
+                                      <p:cBhvr>
+                                        <p:cTn id="22" dur="1000" fill="hold"/>
+                                        <p:tgtEl>
+                                          <p:spTgt spid="3">
+                                            <p:txEl>
+                                              <p:pRg st="2" end="2"/>
+                                            </p:txEl>
+                                          </p:spTgt>
+                                        </p:tgtEl>
+                                        <p:attrNameLst>
+                                          <p:attrName>ppt_x</p:attrName>
+                                        </p:attrNameLst>
+                                      </p:cBhvr>
+                                      <p:tavLst>
+                                        <p:tav tm="0">
+                                          <p:val>
+                                            <p:strVal val="#ppt_x"/>
+                                          </p:val>
+                                        </p:tav>
+                                        <p:tav tm="100000">
+                                          <p:val>
+                                            <p:strVal val="#ppt_x"/>
+                                          </p:val>
+                                        </p:tav>
+                                      </p:tavLst>
+                                    </p:anim>
+                                    <p:anim calcmode="lin" valueType="num">
+                                      <p:cBhvr>
+                                        <p:cTn id="23" dur="1000" fill="hold"/>
+                                        <p:tgtEl>
+                                          <p:spTgt spid="3">
+                                            <p:txEl>
+                                              <p:pRg st="2" end="2"/>
+                                            </p:txEl>
+                                          </p:spTgt>
+                                        </p:tgtEl>
+                                        <p:attrNameLst>
+                                          <p:attrName>ppt_y</p:attrName>
+                                        </p:attrNameLst>
+                                      </p:cBhvr>
+                                      <p:tavLst>
+                                        <p:tav tm="0">
+                                          <p:val>
+                                            <p:strVal val="#ppt_y+.1"/>
+                                          </p:val>
+                                        </p:tav>
+                                        <p:tav tm="100000">
+                                          <p:val>
+                                            <p:strVal val="#ppt_y"/>
+                                          </p:val>
+                                        </p:tav>
+                                      </p:tavLst>
+                                    </p:anim>
+                                  </p:childTnLst>
+                                </p:cTn>
+                              </p:par>
+                            </p:childTnLst>
+                          </p:cTn>
+                        </p:par>
+                      </p:childTnLst>
+                    </p:cTn>
+                  </p:par>
+                  <p:par>
+                    <p:cTn id="24" fill="hold">
+                      <p:stCondLst>
+                        <p:cond delay="indefinite"/>
+                      </p:stCondLst>
+                      <p:childTnLst>
+                        <p:par>
+                          <p:cTn id="25" fill="hold">
+                            <p:stCondLst>
+                              <p:cond delay="0"/>
+                            </p:stCondLst>
+                            <p:childTnLst>
+                              <p:par>
+                                <p:cTn id="26" presetID="42" presetClass="entr" presetSubtype="0" fill="hold" grpId="0" nodeType="clickEffect">
+                                  <p:stCondLst>
+                                    <p:cond delay="0"/>
+                                  </p:stCondLst>
+                                  <p:childTnLst>
+                                    <p:set>
+                                      <p:cBhvr>
+                                        <p:cTn id="27" dur="1" fill="hold">
+                                          <p:stCondLst>
+                                            <p:cond delay="0"/>
+                                          </p:stCondLst>
+                                        </p:cTn>
+                                        <p:tgtEl>
+                                          <p:spTgt spid="3">
+                                            <p:txEl>
+                                              <p:pRg st="3" end="3"/>
+                                            </p:txEl>
+                                          </p:spTgt>
+                                        </p:tgtEl>
+                                        <p:attrNameLst>
+                                          <p:attrName>style.visibility</p:attrName>
+                                        </p:attrNameLst>
+                                      </p:cBhvr>
+                                      <p:to>
+                                        <p:strVal val="visible"/>
+                                      </p:to>
+                                    </p:set>
+                                    <p:animEffect transition="in" filter="fade">
+                                      <p:cBhvr>
+                                        <p:cTn id="28" dur="1000"/>
+                                        <p:tgtEl>
+                                          <p:spTgt spid="3">
+                                            <p:txEl>
+                                              <p:pRg st="3" end="3"/>
+                                            </p:txEl>
+                                          </p:spTgt>
+                                        </p:tgtEl>
+                                      </p:cBhvr>
+                                    </p:animEffect>
+                                    <p:anim calcmode="lin" valueType="num">
+                                      <p:cBhvr>
+                                        <p:cTn id="29" dur="1000" fill="hold"/>
+                                        <p:tgtEl>
+                                          <p:spTgt spid="3">
+                                            <p:txEl>
+                                              <p:pRg st="3" end="3"/>
+                                            </p:txEl>
+                                          </p:spTgt>
+                                        </p:tgtEl>
+                                        <p:attrNameLst>
+                                          <p:attrName>ppt_x</p:attrName>
+                                        </p:attrNameLst>
+                                      </p:cBhvr>
+                                      <p:tavLst>
+                                        <p:tav tm="0">
+                                          <p:val>
+                                            <p:strVal val="#ppt_x"/>
+                                          </p:val>
+                                        </p:tav>
+                                        <p:tav tm="100000">
+                                          <p:val>
+                                            <p:strVal val="#ppt_x"/>
+                                          </p:val>
+                                        </p:tav>
+                                      </p:tavLst>
+                                    </p:anim>
+                                    <p:anim calcmode="lin" valueType="num">
+                                      <p:cBhvr>
+                                        <p:cTn id="30" dur="1000" fill="hold"/>
+                                        <p:tgtEl>
+                                          <p:spTgt spid="3">
+                                            <p:txEl>
+                                              <p:pRg st="3" end="3"/>
+                                            </p:txEl>
+                                          </p:spTgt>
+                                        </p:tgtEl>
+                                        <p:attrNameLst>
+                                          <p:attrName>ppt_y</p:attrName>
+                                        </p:attrNameLst>
+                                      </p:cBhvr>
+                                      <p:tavLst>
+                                        <p:tav tm="0">
+                                          <p:val>
+                                            <p:strVal val="#ppt_y+.1"/>
+                                          </p:val>
+                                        </p:tav>
+                                        <p:tav tm="100000">
+                                          <p:val>
+                                            <p:strVal val="#ppt_y"/>
+                                          </p:val>
+                                        </p:tav>
+                                      </p:tavLst>
+                                    </p:anim>
+                                  </p:childTnLst>
+                                </p:cTn>
+                              </p:par>
+                            </p:childTnLst>
+                          </p:cTn>
+                        </p:par>
+                      </p:childTnLst>
+                    </p:cTn>
+                  </p:par>
+                  <p:par>
+                    <p:cTn id="31" fill="hold">
+                      <p:stCondLst>
+                        <p:cond delay="indefinite"/>
+                      </p:stCondLst>
+                      <p:childTnLst>
+                        <p:par>
+                          <p:cTn id="32" fill="hold">
+                            <p:stCondLst>
+                              <p:cond delay="0"/>
+                            </p:stCondLst>
+                            <p:childTnLst>
+                              <p:par>
+                                <p:cTn id="33" presetID="42" presetClass="entr" presetSubtype="0" fill="hold" grpId="0" nodeType="clickEffect">
+                                  <p:stCondLst>
+                                    <p:cond delay="0"/>
+                                  </p:stCondLst>
+                                  <p:childTnLst>
+                                    <p:set>
+                                      <p:cBhvr>
+                                        <p:cTn id="34" dur="1" fill="hold">
+                                          <p:stCondLst>
+                                            <p:cond delay="0"/>
+                                          </p:stCondLst>
+                                        </p:cTn>
+                                        <p:tgtEl>
+                                          <p:spTgt spid="3">
+                                            <p:txEl>
+                                              <p:pRg st="5" end="5"/>
+                                            </p:txEl>
+                                          </p:spTgt>
+                                        </p:tgtEl>
+                                        <p:attrNameLst>
+                                          <p:attrName>style.visibility</p:attrName>
+                                        </p:attrNameLst>
+                                      </p:cBhvr>
+                                      <p:to>
+                                        <p:strVal val="visible"/>
+                                      </p:to>
+                                    </p:set>
+                                    <p:animEffect transition="in" filter="fade">
+                                      <p:cBhvr>
+                                        <p:cTn id="35" dur="1000"/>
+                                        <p:tgtEl>
+                                          <p:spTgt spid="3">
+                                            <p:txEl>
+                                              <p:pRg st="5" end="5"/>
+                                            </p:txEl>
+                                          </p:spTgt>
+                                        </p:tgtEl>
+                                      </p:cBhvr>
+                                    </p:animEffect>
+                                    <p:anim calcmode="lin" valueType="num">
+                                      <p:cBhvr>
+                                        <p:cTn id="36" dur="1000" fill="hold"/>
+                                        <p:tgtEl>
+                                          <p:spTgt spid="3">
+                                            <p:txEl>
+                                              <p:pRg st="5" end="5"/>
+                                            </p:txEl>
+                                          </p:spTgt>
+                                        </p:tgtEl>
+                                        <p:attrNameLst>
+                                          <p:attrName>ppt_x</p:attrName>
+                                        </p:attrNameLst>
+                                      </p:cBhvr>
+                                      <p:tavLst>
+                                        <p:tav tm="0">
+                                          <p:val>
+                                            <p:strVal val="#ppt_x"/>
+                                          </p:val>
+                                        </p:tav>
+                                        <p:tav tm="100000">
+                                          <p:val>
+                                            <p:strVal val="#ppt_x"/>
+                                          </p:val>
+                                        </p:tav>
+                                      </p:tavLst>
+                                    </p:anim>
+                                    <p:anim calcmode="lin" valueType="num">
+                                      <p:cBhvr>
+                                        <p:cTn id="37" dur="1000" fill="hold"/>
+                                        <p:tgtEl>
+                                          <p:spTgt spid="3">
+                                            <p:txEl>
+                                              <p:pRg st="5" end="5"/>
+                                            </p:txEl>
+                                          </p:spTgt>
+                                        </p:tgtEl>
+                                        <p:attrNameLst>
+                                          <p:attrName>ppt_y</p:attrName>
+                                        </p:attrNameLst>
+                                      </p:cBhvr>
+                                      <p:tavLst>
+                                        <p:tav tm="0">
+                                          <p:val>
+                                            <p:strVal val="#ppt_y+.1"/>
+                                          </p:val>
+                                        </p:tav>
+                                        <p:tav tm="100000">
+                                          <p:val>
+                                            <p:strVal val="#ppt_y"/>
+                                          </p:val>
+                                        </p:tav>
+                                      </p:tavLst>
+                                    </p:anim>
+                                  </p:childTnLst>
+                                </p:cTn>
+                              </p:par>
+                            </p:childTnLst>
+                          </p:cTn>
+                        </p:par>
+                      </p:childTnLst>
+                    </p:cTn>
+                  </p:par>
+                </p:childTnLst>
+              </p:cTn>
+              <p:prevCondLst>
+                <p:cond evt="onPrev" delay="0">
+                  <p:tgtEl>
+                    <p:sldTgt/>
+                  </p:tgtEl>
+                </p:cond>
+              </p:prevCondLst>
+              <p:nextCondLst>
+                <p:cond evt="onNext" delay="0">
+                  <p:tgtEl>
+                    <p:sldTgt/>
+                  </p:tgtEl>
+                </p:cond>
+              </p:nextCondLst>
+            </p:seq>
+          </p:childTnLst>
+        </p:cTn>
+      </p:par>
+    </p:tnLst>
+    <p:bldLst>
+      <p:bldP spid="3" grpId="0" build="p"/>
+    </p:bldLst>
+  </p:timing>
+</p:sld>
+</file>
+
+<file path=ppt/slides/slide4.xml><?xml version="1.0" encoding="utf-8"?>
 <p:sld xmlns:a="http://schemas.openxmlformats.org/drawingml/2006/main" xmlns:r="http://schemas.openxmlformats.org/officeDocument/2006/relationships" xmlns:p="http://schemas.openxmlformats.org/presentationml/2006/main">
   <p:cSld>
     <p:spTree>
@@ -7759,7 +11307,7 @@
 </p:sld>
 </file>
 
-<file path=ppt/slides/slide4.xml><?xml version="1.0" encoding="utf-8"?>
+<file path=ppt/slides/slide5.xml><?xml version="1.0" encoding="utf-8"?>
 <p:sld xmlns:a="http://schemas.openxmlformats.org/drawingml/2006/main" xmlns:r="http://schemas.openxmlformats.org/officeDocument/2006/relationships" xmlns:p="http://schemas.openxmlformats.org/presentationml/2006/main">
   <p:cSld>
     <p:spTree>
@@ -7823,13 +11371,8 @@
           <a:p>
             <a:r>
               <a:rPr lang="en-US" dirty="0" smtClean="0"/>
-              <a:t>IT departments are mean – </a:t>
-            </a:r>
-            <a:r>
-              <a:rPr lang="en-US" dirty="0" smtClean="0"/>
-              <a:t>New frameworks are scary!</a:t>
-            </a:r>
-            <a:endParaRPr lang="en-US" dirty="0" smtClean="0"/>
+              <a:t>IT departments are mean – New frameworks are scary!</a:t>
+            </a:r>
           </a:p>
           <a:p>
             <a:pPr lvl="1"/>
@@ -8450,7 +11993,7 @@
 </p:sld>
 </file>
 
-<file path=ppt/slides/slide5.xml><?xml version="1.0" encoding="utf-8"?>
+<file path=ppt/slides/slide6.xml><?xml version="1.0" encoding="utf-8"?>
 <p:sld xmlns:a="http://schemas.openxmlformats.org/drawingml/2006/main" xmlns:r="http://schemas.openxmlformats.org/officeDocument/2006/relationships" xmlns:p="http://schemas.openxmlformats.org/presentationml/2006/main">
   <p:cSld>
     <p:spTree>
@@ -9194,7 +12737,7 @@
 </p:sld>
 </file>
 
-<file path=ppt/slides/slide6.xml><?xml version="1.0" encoding="utf-8"?>
+<file path=ppt/slides/slide7.xml><?xml version="1.0" encoding="utf-8"?>
 <p:sld xmlns:a="http://schemas.openxmlformats.org/drawingml/2006/main" xmlns:r="http://schemas.openxmlformats.org/officeDocument/2006/relationships" xmlns:p="http://schemas.openxmlformats.org/presentationml/2006/main">
   <p:cSld>
     <p:spTree>
@@ -9271,8 +12814,28 @@
           <a:p>
             <a:r>
               <a:rPr lang="en-US" dirty="0" smtClean="0"/>
-              <a:t>Dependency Injection baked in</a:t>
-            </a:r>
+              <a:t>Dependency Injection baked </a:t>
+            </a:r>
+            <a:r>
+              <a:rPr lang="en-US" dirty="0" smtClean="0"/>
+              <a:t>in</a:t>
+            </a:r>
+          </a:p>
+          <a:p>
+            <a:pPr lvl="1"/>
+            <a:r>
+              <a:rPr lang="en-US" dirty="0" smtClean="0"/>
+              <a:t>Also supports 3</a:t>
+            </a:r>
+            <a:r>
+              <a:rPr lang="en-US" baseline="30000" dirty="0" smtClean="0"/>
+              <a:t>rd</a:t>
+            </a:r>
+            <a:r>
+              <a:rPr lang="en-US" dirty="0" smtClean="0"/>
+              <a:t> party containers</a:t>
+            </a:r>
+            <a:endParaRPr lang="en-US" dirty="0" smtClean="0"/>
           </a:p>
           <a:p>
             <a:r>
@@ -9284,8 +12847,13 @@
             <a:pPr lvl="1"/>
             <a:r>
               <a:rPr lang="en-US" dirty="0" smtClean="0"/>
-              <a:t>No build step = increased developer productivity</a:t>
-            </a:r>
+              <a:t>No build step = increased developer </a:t>
+            </a:r>
+            <a:r>
+              <a:rPr lang="en-US" dirty="0" smtClean="0"/>
+              <a:t>productivity *(not yet)</a:t>
+            </a:r>
+            <a:endParaRPr lang="en-US" dirty="0" smtClean="0"/>
           </a:p>
           <a:p>
             <a:r>
@@ -9499,33 +13067,15 @@
                                   </p:childTnLst>
                                 </p:cTn>
                               </p:par>
-                            </p:childTnLst>
-                          </p:cTn>
-                        </p:par>
-                      </p:childTnLst>
-                    </p:cTn>
-                  </p:par>
-                  <p:par>
-                    <p:cTn id="16" fill="hold">
-                      <p:stCondLst>
-                        <p:cond delay="indefinite"/>
-                      </p:stCondLst>
-                      <p:childTnLst>
-                        <p:par>
-                          <p:cTn id="17" fill="hold">
-                            <p:stCondLst>
-                              <p:cond delay="0"/>
-                            </p:stCondLst>
-                            <p:childTnLst>
                               <p:par>
-                                <p:cTn id="18" presetID="10" presetClass="entr" presetSubtype="0" fill="hold" grpId="0" nodeType="clickEffect">
+                                <p:cTn id="16" presetID="10" presetClass="entr" presetSubtype="0" fill="hold" grpId="0" nodeType="withEffect">
                                   <p:stCondLst>
                                     <p:cond delay="0"/>
                                   </p:stCondLst>
                                   <p:childTnLst>
                                     <p:set>
                                       <p:cBhvr>
-                                        <p:cTn id="19" dur="1" fill="hold">
+                                        <p:cTn id="17" dur="1" fill="hold">
                                           <p:stCondLst>
                                             <p:cond delay="0"/>
                                           </p:stCondLst>
@@ -9547,7 +13097,7 @@
                                     </p:set>
                                     <p:animEffect transition="in" filter="fade">
                                       <p:cBhvr>
-                                        <p:cTn id="20" dur="500"/>
+                                        <p:cTn id="18" dur="500"/>
                                         <p:tgtEl>
                                           <p:spTgt spid="3">
                                             <p:txEl>
@@ -9560,8 +13110,26 @@
                                   </p:childTnLst>
                                 </p:cTn>
                               </p:par>
+                            </p:childTnLst>
+                          </p:cTn>
+                        </p:par>
+                      </p:childTnLst>
+                    </p:cTn>
+                  </p:par>
+                  <p:par>
+                    <p:cTn id="19" fill="hold">
+                      <p:stCondLst>
+                        <p:cond delay="indefinite"/>
+                      </p:stCondLst>
+                      <p:childTnLst>
+                        <p:par>
+                          <p:cTn id="20" fill="hold">
+                            <p:stCondLst>
+                              <p:cond delay="0"/>
+                            </p:stCondLst>
+                            <p:childTnLst>
                               <p:par>
-                                <p:cTn id="21" presetID="10" presetClass="entr" presetSubtype="0" fill="hold" grpId="0" nodeType="withEffect">
+                                <p:cTn id="21" presetID="10" presetClass="entr" presetSubtype="0" fill="hold" grpId="0" nodeType="clickEffect">
                                   <p:stCondLst>
                                     <p:cond delay="0"/>
                                   </p:stCondLst>
@@ -9603,33 +13171,15 @@
                                   </p:childTnLst>
                                 </p:cTn>
                               </p:par>
-                            </p:childTnLst>
-                          </p:cTn>
-                        </p:par>
-                      </p:childTnLst>
-                    </p:cTn>
-                  </p:par>
-                  <p:par>
-                    <p:cTn id="24" fill="hold">
-                      <p:stCondLst>
-                        <p:cond delay="indefinite"/>
-                      </p:stCondLst>
-                      <p:childTnLst>
-                        <p:par>
-                          <p:cTn id="25" fill="hold">
-                            <p:stCondLst>
-                              <p:cond delay="0"/>
-                            </p:stCondLst>
-                            <p:childTnLst>
                               <p:par>
-                                <p:cTn id="26" presetID="10" presetClass="entr" presetSubtype="0" fill="hold" grpId="0" nodeType="clickEffect">
+                                <p:cTn id="24" presetID="10" presetClass="entr" presetSubtype="0" fill="hold" grpId="0" nodeType="withEffect">
                                   <p:stCondLst>
                                     <p:cond delay="0"/>
                                   </p:stCondLst>
                                   <p:childTnLst>
                                     <p:set>
                                       <p:cBhvr>
-                                        <p:cTn id="27" dur="1" fill="hold">
+                                        <p:cTn id="25" dur="1" fill="hold">
                                           <p:stCondLst>
                                             <p:cond delay="0"/>
                                           </p:stCondLst>
@@ -9651,7 +13201,7 @@
                                     </p:set>
                                     <p:animEffect transition="in" filter="fade">
                                       <p:cBhvr>
-                                        <p:cTn id="28" dur="500"/>
+                                        <p:cTn id="26" dur="500"/>
                                         <p:tgtEl>
                                           <p:spTgt spid="3">
                                             <p:txEl>
@@ -9664,8 +13214,26 @@
                                   </p:childTnLst>
                                 </p:cTn>
                               </p:par>
+                            </p:childTnLst>
+                          </p:cTn>
+                        </p:par>
+                      </p:childTnLst>
+                    </p:cTn>
+                  </p:par>
+                  <p:par>
+                    <p:cTn id="27" fill="hold">
+                      <p:stCondLst>
+                        <p:cond delay="indefinite"/>
+                      </p:stCondLst>
+                      <p:childTnLst>
+                        <p:par>
+                          <p:cTn id="28" fill="hold">
+                            <p:stCondLst>
+                              <p:cond delay="0"/>
+                            </p:stCondLst>
+                            <p:childTnLst>
                               <p:par>
-                                <p:cTn id="29" presetID="10" presetClass="entr" presetSubtype="0" fill="hold" grpId="0" nodeType="withEffect">
+                                <p:cTn id="29" presetID="10" presetClass="entr" presetSubtype="0" fill="hold" grpId="0" nodeType="clickEffect">
                                   <p:stCondLst>
                                     <p:cond delay="0"/>
                                   </p:stCondLst>
@@ -9750,6 +13318,49 @@
                                   </p:childTnLst>
                                 </p:cTn>
                               </p:par>
+                              <p:par>
+                                <p:cTn id="35" presetID="10" presetClass="entr" presetSubtype="0" fill="hold" grpId="0" nodeType="withEffect">
+                                  <p:stCondLst>
+                                    <p:cond delay="0"/>
+                                  </p:stCondLst>
+                                  <p:childTnLst>
+                                    <p:set>
+                                      <p:cBhvr>
+                                        <p:cTn id="36" dur="1" fill="hold">
+                                          <p:stCondLst>
+                                            <p:cond delay="0"/>
+                                          </p:stCondLst>
+                                        </p:cTn>
+                                        <p:tgtEl>
+                                          <p:spTgt spid="3">
+                                            <p:txEl>
+                                              <p:pRg st="8" end="8"/>
+                                            </p:txEl>
+                                          </p:spTgt>
+                                        </p:tgtEl>
+                                        <p:attrNameLst>
+                                          <p:attrName>style.visibility</p:attrName>
+                                        </p:attrNameLst>
+                                      </p:cBhvr>
+                                      <p:to>
+                                        <p:strVal val="visible"/>
+                                      </p:to>
+                                    </p:set>
+                                    <p:animEffect transition="in" filter="fade">
+                                      <p:cBhvr>
+                                        <p:cTn id="37" dur="500"/>
+                                        <p:tgtEl>
+                                          <p:spTgt spid="3">
+                                            <p:txEl>
+                                              <p:pRg st="8" end="8"/>
+                                            </p:txEl>
+                                          </p:spTgt>
+                                        </p:tgtEl>
+                                      </p:cBhvr>
+                                    </p:animEffect>
+                                  </p:childTnLst>
+                                </p:cTn>
+                              </p:par>
                             </p:childTnLst>
                           </p:cTn>
                         </p:par>
@@ -9784,7 +13395,7 @@
 </p:sld>
 </file>
 
-<file path=ppt/slides/slide7.xml><?xml version="1.0" encoding="utf-8"?>
+<file path=ppt/slides/slide8.xml><?xml version="1.0" encoding="utf-8"?>
 <p:sld xmlns:a="http://schemas.openxmlformats.org/drawingml/2006/main" xmlns:r="http://schemas.openxmlformats.org/officeDocument/2006/relationships" xmlns:p="http://schemas.openxmlformats.org/presentationml/2006/main">
   <p:cSld>
     <p:spTree>
@@ -10387,7 +13998,7 @@
 </p:sld>
 </file>
 
-<file path=ppt/slides/slide8.xml><?xml version="1.0" encoding="utf-8"?>
+<file path=ppt/slides/slide9.xml><?xml version="1.0" encoding="utf-8"?>
 <p:sld xmlns:a="http://schemas.openxmlformats.org/drawingml/2006/main" xmlns:r="http://schemas.openxmlformats.org/officeDocument/2006/relationships" xmlns:p="http://schemas.openxmlformats.org/presentationml/2006/main">
   <p:cSld>
     <p:spTree>
@@ -10509,7 +14120,11 @@
             </a:r>
             <a:r>
               <a:rPr lang="en-US" dirty="0" smtClean="0"/>
-              <a:t> at all </a:t>
+              <a:t> </a:t>
+            </a:r>
+            <a:r>
+              <a:rPr lang="en-US" b="1" dirty="0" smtClean="0"/>
+              <a:t>at all </a:t>
             </a:r>
           </a:p>
           <a:p>
@@ -10940,567 +14555,6 @@
 </p:sld>
 </file>
 
-<file path=ppt/slides/slide9.xml><?xml version="1.0" encoding="utf-8"?>
-<p:sld xmlns:a="http://schemas.openxmlformats.org/drawingml/2006/main" xmlns:r="http://schemas.openxmlformats.org/officeDocument/2006/relationships" xmlns:p="http://schemas.openxmlformats.org/presentationml/2006/main">
-  <p:cSld>
-    <p:spTree>
-      <p:nvGrpSpPr>
-        <p:cNvPr id="1" name=""/>
-        <p:cNvGrpSpPr/>
-        <p:nvPr/>
-      </p:nvGrpSpPr>
-      <p:grpSpPr>
-        <a:xfrm>
-          <a:off x="0" y="0"/>
-          <a:ext cx="0" cy="0"/>
-          <a:chOff x="0" y="0"/>
-          <a:chExt cx="0" cy="0"/>
-        </a:xfrm>
-      </p:grpSpPr>
-      <p:sp>
-        <p:nvSpPr>
-          <p:cNvPr id="2" name="Title 1"/>
-          <p:cNvSpPr>
-            <a:spLocks noGrp="1"/>
-          </p:cNvSpPr>
-          <p:nvPr>
-            <p:ph type="title"/>
-          </p:nvPr>
-        </p:nvSpPr>
-        <p:spPr/>
-        <p:txBody>
-          <a:bodyPr/>
-          <a:lstStyle/>
-          <a:p>
-            <a:r>
-              <a:rPr lang="en-US" dirty="0" smtClean="0"/>
-              <a:t>Before we Begin the Demos…</a:t>
-            </a:r>
-            <a:endParaRPr lang="en-US" dirty="0"/>
-          </a:p>
-        </p:txBody>
-      </p:sp>
-      <p:sp>
-        <p:nvSpPr>
-          <p:cNvPr id="3" name="Content Placeholder 2"/>
-          <p:cNvSpPr>
-            <a:spLocks noGrp="1"/>
-          </p:cNvSpPr>
-          <p:nvPr>
-            <p:ph idx="1"/>
-          </p:nvPr>
-        </p:nvSpPr>
-        <p:spPr/>
-        <p:txBody>
-          <a:bodyPr/>
-          <a:lstStyle/>
-          <a:p>
-            <a:r>
-              <a:rPr lang="en-US" dirty="0" smtClean="0"/>
-              <a:t>This is SUPER early</a:t>
-            </a:r>
-          </a:p>
-          <a:p>
-            <a:r>
-              <a:rPr lang="en-US" dirty="0" smtClean="0"/>
-              <a:t>Very volatile code – breaking changes are frequent</a:t>
-            </a:r>
-          </a:p>
-          <a:p>
-            <a:r>
-              <a:rPr lang="en-US" dirty="0" smtClean="0"/>
-              <a:t>Lots of things are missing.  Some things don’t work right</a:t>
-            </a:r>
-          </a:p>
-          <a:p>
-            <a:r>
-              <a:rPr lang="en-US" dirty="0" smtClean="0"/>
-              <a:t>It’s an unprecedented level of openness for Microsoft</a:t>
-            </a:r>
-          </a:p>
-          <a:p>
-            <a:pPr lvl="1"/>
-            <a:r>
-              <a:rPr lang="en-US" dirty="0" smtClean="0"/>
-              <a:t>Code is on GitHub (yes – they take pull requests)</a:t>
-            </a:r>
-          </a:p>
-          <a:p>
-            <a:pPr lvl="1"/>
-            <a:r>
-              <a:rPr lang="en-US" dirty="0" smtClean="0"/>
-              <a:t>Backlog and sprint planning is open and accessible on </a:t>
-            </a:r>
-            <a:r>
-              <a:rPr lang="en-US" dirty="0" err="1" smtClean="0"/>
-              <a:t>HuBoard</a:t>
-            </a:r>
-            <a:r>
-              <a:rPr lang="en-US" dirty="0" smtClean="0"/>
-              <a:t> </a:t>
-            </a:r>
-          </a:p>
-          <a:p>
-            <a:endParaRPr lang="en-US" dirty="0" smtClean="0"/>
-          </a:p>
-          <a:p>
-            <a:r>
-              <a:rPr lang="en-US" dirty="0" smtClean="0"/>
-              <a:t>With that said…</a:t>
-            </a:r>
-            <a:endParaRPr lang="en-US" dirty="0"/>
-          </a:p>
-        </p:txBody>
-      </p:sp>
-    </p:spTree>
-    <p:extLst>
-      <p:ext uri="{BB962C8B-B14F-4D97-AF65-F5344CB8AC3E}">
-        <p14:creationId xmlns:p14="http://schemas.microsoft.com/office/powerpoint/2010/main" val="3826486159"/>
-      </p:ext>
-    </p:extLst>
-  </p:cSld>
-  <p:clrMapOvr>
-    <a:masterClrMapping/>
-  </p:clrMapOvr>
-  <mc:AlternateContent xmlns:mc="http://schemas.openxmlformats.org/markup-compatibility/2006" xmlns:p14="http://schemas.microsoft.com/office/powerpoint/2010/main">
-    <mc:Choice Requires="p14">
-      <p:transition spd="slow">
-        <p14:glitter pattern="hexagon"/>
-      </p:transition>
-    </mc:Choice>
-    <mc:Fallback xmlns="">
-      <p:transition spd="slow">
-        <p:fade/>
-      </p:transition>
-    </mc:Fallback>
-  </mc:AlternateContent>
-  <p:timing>
-    <p:tnLst>
-      <p:par>
-        <p:cTn id="1" dur="indefinite" restart="never" nodeType="tmRoot">
-          <p:childTnLst>
-            <p:seq concurrent="1" nextAc="seek">
-              <p:cTn id="2" dur="indefinite" nodeType="mainSeq">
-                <p:childTnLst>
-                  <p:par>
-                    <p:cTn id="3" fill="hold">
-                      <p:stCondLst>
-                        <p:cond delay="indefinite"/>
-                      </p:stCondLst>
-                      <p:childTnLst>
-                        <p:par>
-                          <p:cTn id="4" fill="hold">
-                            <p:stCondLst>
-                              <p:cond delay="0"/>
-                            </p:stCondLst>
-                            <p:childTnLst>
-                              <p:par>
-                                <p:cTn id="5" presetID="10" presetClass="entr" presetSubtype="0" fill="hold" grpId="0" nodeType="clickEffect">
-                                  <p:stCondLst>
-                                    <p:cond delay="0"/>
-                                  </p:stCondLst>
-                                  <p:childTnLst>
-                                    <p:set>
-                                      <p:cBhvr>
-                                        <p:cTn id="6" dur="1" fill="hold">
-                                          <p:stCondLst>
-                                            <p:cond delay="0"/>
-                                          </p:stCondLst>
-                                        </p:cTn>
-                                        <p:tgtEl>
-                                          <p:spTgt spid="3">
-                                            <p:txEl>
-                                              <p:pRg st="0" end="0"/>
-                                            </p:txEl>
-                                          </p:spTgt>
-                                        </p:tgtEl>
-                                        <p:attrNameLst>
-                                          <p:attrName>style.visibility</p:attrName>
-                                        </p:attrNameLst>
-                                      </p:cBhvr>
-                                      <p:to>
-                                        <p:strVal val="visible"/>
-                                      </p:to>
-                                    </p:set>
-                                    <p:animEffect transition="in" filter="fade">
-                                      <p:cBhvr>
-                                        <p:cTn id="7" dur="500"/>
-                                        <p:tgtEl>
-                                          <p:spTgt spid="3">
-                                            <p:txEl>
-                                              <p:pRg st="0" end="0"/>
-                                            </p:txEl>
-                                          </p:spTgt>
-                                        </p:tgtEl>
-                                      </p:cBhvr>
-                                    </p:animEffect>
-                                  </p:childTnLst>
-                                </p:cTn>
-                              </p:par>
-                            </p:childTnLst>
-                          </p:cTn>
-                        </p:par>
-                      </p:childTnLst>
-                    </p:cTn>
-                  </p:par>
-                  <p:par>
-                    <p:cTn id="8" fill="hold">
-                      <p:stCondLst>
-                        <p:cond delay="indefinite"/>
-                      </p:stCondLst>
-                      <p:childTnLst>
-                        <p:par>
-                          <p:cTn id="9" fill="hold">
-                            <p:stCondLst>
-                              <p:cond delay="0"/>
-                            </p:stCondLst>
-                            <p:childTnLst>
-                              <p:par>
-                                <p:cTn id="10" presetID="10" presetClass="entr" presetSubtype="0" fill="hold" grpId="0" nodeType="clickEffect">
-                                  <p:stCondLst>
-                                    <p:cond delay="0"/>
-                                  </p:stCondLst>
-                                  <p:childTnLst>
-                                    <p:set>
-                                      <p:cBhvr>
-                                        <p:cTn id="11" dur="1" fill="hold">
-                                          <p:stCondLst>
-                                            <p:cond delay="0"/>
-                                          </p:stCondLst>
-                                        </p:cTn>
-                                        <p:tgtEl>
-                                          <p:spTgt spid="3">
-                                            <p:txEl>
-                                              <p:pRg st="1" end="1"/>
-                                            </p:txEl>
-                                          </p:spTgt>
-                                        </p:tgtEl>
-                                        <p:attrNameLst>
-                                          <p:attrName>style.visibility</p:attrName>
-                                        </p:attrNameLst>
-                                      </p:cBhvr>
-                                      <p:to>
-                                        <p:strVal val="visible"/>
-                                      </p:to>
-                                    </p:set>
-                                    <p:animEffect transition="in" filter="fade">
-                                      <p:cBhvr>
-                                        <p:cTn id="12" dur="500"/>
-                                        <p:tgtEl>
-                                          <p:spTgt spid="3">
-                                            <p:txEl>
-                                              <p:pRg st="1" end="1"/>
-                                            </p:txEl>
-                                          </p:spTgt>
-                                        </p:tgtEl>
-                                      </p:cBhvr>
-                                    </p:animEffect>
-                                  </p:childTnLst>
-                                </p:cTn>
-                              </p:par>
-                            </p:childTnLst>
-                          </p:cTn>
-                        </p:par>
-                      </p:childTnLst>
-                    </p:cTn>
-                  </p:par>
-                  <p:par>
-                    <p:cTn id="13" fill="hold">
-                      <p:stCondLst>
-                        <p:cond delay="indefinite"/>
-                      </p:stCondLst>
-                      <p:childTnLst>
-                        <p:par>
-                          <p:cTn id="14" fill="hold">
-                            <p:stCondLst>
-                              <p:cond delay="0"/>
-                            </p:stCondLst>
-                            <p:childTnLst>
-                              <p:par>
-                                <p:cTn id="15" presetID="10" presetClass="entr" presetSubtype="0" fill="hold" grpId="0" nodeType="clickEffect">
-                                  <p:stCondLst>
-                                    <p:cond delay="0"/>
-                                  </p:stCondLst>
-                                  <p:childTnLst>
-                                    <p:set>
-                                      <p:cBhvr>
-                                        <p:cTn id="16" dur="1" fill="hold">
-                                          <p:stCondLst>
-                                            <p:cond delay="0"/>
-                                          </p:stCondLst>
-                                        </p:cTn>
-                                        <p:tgtEl>
-                                          <p:spTgt spid="3">
-                                            <p:txEl>
-                                              <p:pRg st="2" end="2"/>
-                                            </p:txEl>
-                                          </p:spTgt>
-                                        </p:tgtEl>
-                                        <p:attrNameLst>
-                                          <p:attrName>style.visibility</p:attrName>
-                                        </p:attrNameLst>
-                                      </p:cBhvr>
-                                      <p:to>
-                                        <p:strVal val="visible"/>
-                                      </p:to>
-                                    </p:set>
-                                    <p:animEffect transition="in" filter="fade">
-                                      <p:cBhvr>
-                                        <p:cTn id="17" dur="500"/>
-                                        <p:tgtEl>
-                                          <p:spTgt spid="3">
-                                            <p:txEl>
-                                              <p:pRg st="2" end="2"/>
-                                            </p:txEl>
-                                          </p:spTgt>
-                                        </p:tgtEl>
-                                      </p:cBhvr>
-                                    </p:animEffect>
-                                  </p:childTnLst>
-                                </p:cTn>
-                              </p:par>
-                            </p:childTnLst>
-                          </p:cTn>
-                        </p:par>
-                      </p:childTnLst>
-                    </p:cTn>
-                  </p:par>
-                  <p:par>
-                    <p:cTn id="18" fill="hold">
-                      <p:stCondLst>
-                        <p:cond delay="indefinite"/>
-                      </p:stCondLst>
-                      <p:childTnLst>
-                        <p:par>
-                          <p:cTn id="19" fill="hold">
-                            <p:stCondLst>
-                              <p:cond delay="0"/>
-                            </p:stCondLst>
-                            <p:childTnLst>
-                              <p:par>
-                                <p:cTn id="20" presetID="10" presetClass="entr" presetSubtype="0" fill="hold" grpId="0" nodeType="clickEffect">
-                                  <p:stCondLst>
-                                    <p:cond delay="0"/>
-                                  </p:stCondLst>
-                                  <p:childTnLst>
-                                    <p:set>
-                                      <p:cBhvr>
-                                        <p:cTn id="21" dur="1" fill="hold">
-                                          <p:stCondLst>
-                                            <p:cond delay="0"/>
-                                          </p:stCondLst>
-                                        </p:cTn>
-                                        <p:tgtEl>
-                                          <p:spTgt spid="3">
-                                            <p:txEl>
-                                              <p:pRg st="3" end="3"/>
-                                            </p:txEl>
-                                          </p:spTgt>
-                                        </p:tgtEl>
-                                        <p:attrNameLst>
-                                          <p:attrName>style.visibility</p:attrName>
-                                        </p:attrNameLst>
-                                      </p:cBhvr>
-                                      <p:to>
-                                        <p:strVal val="visible"/>
-                                      </p:to>
-                                    </p:set>
-                                    <p:animEffect transition="in" filter="fade">
-                                      <p:cBhvr>
-                                        <p:cTn id="22" dur="500"/>
-                                        <p:tgtEl>
-                                          <p:spTgt spid="3">
-                                            <p:txEl>
-                                              <p:pRg st="3" end="3"/>
-                                            </p:txEl>
-                                          </p:spTgt>
-                                        </p:tgtEl>
-                                      </p:cBhvr>
-                                    </p:animEffect>
-                                  </p:childTnLst>
-                                </p:cTn>
-                              </p:par>
-                              <p:par>
-                                <p:cTn id="23" presetID="10" presetClass="entr" presetSubtype="0" fill="hold" grpId="0" nodeType="withEffect">
-                                  <p:stCondLst>
-                                    <p:cond delay="0"/>
-                                  </p:stCondLst>
-                                  <p:childTnLst>
-                                    <p:set>
-                                      <p:cBhvr>
-                                        <p:cTn id="24" dur="1" fill="hold">
-                                          <p:stCondLst>
-                                            <p:cond delay="0"/>
-                                          </p:stCondLst>
-                                        </p:cTn>
-                                        <p:tgtEl>
-                                          <p:spTgt spid="3">
-                                            <p:txEl>
-                                              <p:pRg st="4" end="4"/>
-                                            </p:txEl>
-                                          </p:spTgt>
-                                        </p:tgtEl>
-                                        <p:attrNameLst>
-                                          <p:attrName>style.visibility</p:attrName>
-                                        </p:attrNameLst>
-                                      </p:cBhvr>
-                                      <p:to>
-                                        <p:strVal val="visible"/>
-                                      </p:to>
-                                    </p:set>
-                                    <p:animEffect transition="in" filter="fade">
-                                      <p:cBhvr>
-                                        <p:cTn id="25" dur="500"/>
-                                        <p:tgtEl>
-                                          <p:spTgt spid="3">
-                                            <p:txEl>
-                                              <p:pRg st="4" end="4"/>
-                                            </p:txEl>
-                                          </p:spTgt>
-                                        </p:tgtEl>
-                                      </p:cBhvr>
-                                    </p:animEffect>
-                                  </p:childTnLst>
-                                </p:cTn>
-                              </p:par>
-                              <p:par>
-                                <p:cTn id="26" presetID="10" presetClass="entr" presetSubtype="0" fill="hold" grpId="0" nodeType="withEffect">
-                                  <p:stCondLst>
-                                    <p:cond delay="0"/>
-                                  </p:stCondLst>
-                                  <p:childTnLst>
-                                    <p:set>
-                                      <p:cBhvr>
-                                        <p:cTn id="27" dur="1" fill="hold">
-                                          <p:stCondLst>
-                                            <p:cond delay="0"/>
-                                          </p:stCondLst>
-                                        </p:cTn>
-                                        <p:tgtEl>
-                                          <p:spTgt spid="3">
-                                            <p:txEl>
-                                              <p:pRg st="5" end="5"/>
-                                            </p:txEl>
-                                          </p:spTgt>
-                                        </p:tgtEl>
-                                        <p:attrNameLst>
-                                          <p:attrName>style.visibility</p:attrName>
-                                        </p:attrNameLst>
-                                      </p:cBhvr>
-                                      <p:to>
-                                        <p:strVal val="visible"/>
-                                      </p:to>
-                                    </p:set>
-                                    <p:animEffect transition="in" filter="fade">
-                                      <p:cBhvr>
-                                        <p:cTn id="28" dur="500"/>
-                                        <p:tgtEl>
-                                          <p:spTgt spid="3">
-                                            <p:txEl>
-                                              <p:pRg st="5" end="5"/>
-                                            </p:txEl>
-                                          </p:spTgt>
-                                        </p:tgtEl>
-                                      </p:cBhvr>
-                                    </p:animEffect>
-                                  </p:childTnLst>
-                                </p:cTn>
-                              </p:par>
-                            </p:childTnLst>
-                          </p:cTn>
-                        </p:par>
-                      </p:childTnLst>
-                    </p:cTn>
-                  </p:par>
-                  <p:par>
-                    <p:cTn id="29" fill="hold">
-                      <p:stCondLst>
-                        <p:cond delay="indefinite"/>
-                      </p:stCondLst>
-                      <p:childTnLst>
-                        <p:par>
-                          <p:cTn id="30" fill="hold">
-                            <p:stCondLst>
-                              <p:cond delay="0"/>
-                            </p:stCondLst>
-                            <p:childTnLst>
-                              <p:par>
-                                <p:cTn id="31" presetID="10" presetClass="entr" presetSubtype="0" fill="hold" grpId="0" nodeType="clickEffect">
-                                  <p:stCondLst>
-                                    <p:cond delay="0"/>
-                                  </p:stCondLst>
-                                  <p:childTnLst>
-                                    <p:set>
-                                      <p:cBhvr>
-                                        <p:cTn id="32" dur="1" fill="hold">
-                                          <p:stCondLst>
-                                            <p:cond delay="0"/>
-                                          </p:stCondLst>
-                                        </p:cTn>
-                                        <p:tgtEl>
-                                          <p:spTgt spid="3">
-                                            <p:txEl>
-                                              <p:pRg st="7" end="7"/>
-                                            </p:txEl>
-                                          </p:spTgt>
-                                        </p:tgtEl>
-                                        <p:attrNameLst>
-                                          <p:attrName>style.visibility</p:attrName>
-                                        </p:attrNameLst>
-                                      </p:cBhvr>
-                                      <p:to>
-                                        <p:strVal val="visible"/>
-                                      </p:to>
-                                    </p:set>
-                                    <p:animEffect transition="in" filter="fade">
-                                      <p:cBhvr>
-                                        <p:cTn id="33" dur="500"/>
-                                        <p:tgtEl>
-                                          <p:spTgt spid="3">
-                                            <p:txEl>
-                                              <p:pRg st="7" end="7"/>
-                                            </p:txEl>
-                                          </p:spTgt>
-                                        </p:tgtEl>
-                                      </p:cBhvr>
-                                    </p:animEffect>
-                                  </p:childTnLst>
-                                </p:cTn>
-                              </p:par>
-                            </p:childTnLst>
-                          </p:cTn>
-                        </p:par>
-                      </p:childTnLst>
-                    </p:cTn>
-                  </p:par>
-                </p:childTnLst>
-              </p:cTn>
-              <p:prevCondLst>
-                <p:cond evt="onPrev" delay="0">
-                  <p:tgtEl>
-                    <p:sldTgt/>
-                  </p:tgtEl>
-                </p:cond>
-              </p:prevCondLst>
-              <p:nextCondLst>
-                <p:cond evt="onNext" delay="0">
-                  <p:tgtEl>
-                    <p:sldTgt/>
-                  </p:tgtEl>
-                </p:cond>
-              </p:nextCondLst>
-            </p:seq>
-          </p:childTnLst>
-        </p:cTn>
-      </p:par>
-    </p:tnLst>
-    <p:bldLst>
-      <p:bldP spid="3" grpId="0" build="p"/>
-    </p:bldLst>
-  </p:timing>
-</p:sld>
-</file>
-
 <file path=ppt/theme/theme1.xml><?xml version="1.0" encoding="utf-8"?>
 <a:theme xmlns:a="http://schemas.openxmlformats.org/drawingml/2006/main" name="Parallax">
   <a:themeElements>
@@ -11755,4 +14809,265 @@
     </a:ext>
   </a:extLst>
 </a:theme>
+</file>
+
+<file path=ppt/theme/theme2.xml><?xml version="1.0" encoding="utf-8"?>
+<a:theme xmlns:a="http://schemas.openxmlformats.org/drawingml/2006/main" name="Office Theme">
+  <a:themeElements>
+    <a:clrScheme name="Office">
+      <a:dk1>
+        <a:sysClr val="windowText" lastClr="000000"/>
+      </a:dk1>
+      <a:lt1>
+        <a:sysClr val="window" lastClr="FFFFFF"/>
+      </a:lt1>
+      <a:dk2>
+        <a:srgbClr val="44546A"/>
+      </a:dk2>
+      <a:lt2>
+        <a:srgbClr val="E7E6E6"/>
+      </a:lt2>
+      <a:accent1>
+        <a:srgbClr val="5B9BD5"/>
+      </a:accent1>
+      <a:accent2>
+        <a:srgbClr val="ED7D31"/>
+      </a:accent2>
+      <a:accent3>
+        <a:srgbClr val="A5A5A5"/>
+      </a:accent3>
+      <a:accent4>
+        <a:srgbClr val="FFC000"/>
+      </a:accent4>
+      <a:accent5>
+        <a:srgbClr val="4472C4"/>
+      </a:accent5>
+      <a:accent6>
+        <a:srgbClr val="70AD47"/>
+      </a:accent6>
+      <a:hlink>
+        <a:srgbClr val="0563C1"/>
+      </a:hlink>
+      <a:folHlink>
+        <a:srgbClr val="954F72"/>
+      </a:folHlink>
+    </a:clrScheme>
+    <a:fontScheme name="Office">
+      <a:majorFont>
+        <a:latin typeface="Calibri Light" panose="020F0302020204030204"/>
+        <a:ea typeface=""/>
+        <a:cs typeface=""/>
+        <a:font script="Jpan" typeface="ＭＳ Ｐゴシック"/>
+        <a:font script="Hang" typeface="맑은 고딕"/>
+        <a:font script="Hans" typeface="宋体"/>
+        <a:font script="Hant" typeface="新細明體"/>
+        <a:font script="Arab" typeface="Times New Roman"/>
+        <a:font script="Hebr" typeface="Times New Roman"/>
+        <a:font script="Thai" typeface="Angsana New"/>
+        <a:font script="Ethi" typeface="Nyala"/>
+        <a:font script="Beng" typeface="Vrinda"/>
+        <a:font script="Gujr" typeface="Shruti"/>
+        <a:font script="Khmr" typeface="MoolBoran"/>
+        <a:font script="Knda" typeface="Tunga"/>
+        <a:font script="Guru" typeface="Raavi"/>
+        <a:font script="Cans" typeface="Euphemia"/>
+        <a:font script="Cher" typeface="Plantagenet Cherokee"/>
+        <a:font script="Yiii" typeface="Microsoft Yi Baiti"/>
+        <a:font script="Tibt" typeface="Microsoft Himalaya"/>
+        <a:font script="Thaa" typeface="MV Boli"/>
+        <a:font script="Deva" typeface="Mangal"/>
+        <a:font script="Telu" typeface="Gautami"/>
+        <a:font script="Taml" typeface="Latha"/>
+        <a:font script="Syrc" typeface="Estrangelo Edessa"/>
+        <a:font script="Orya" typeface="Kalinga"/>
+        <a:font script="Mlym" typeface="Kartika"/>
+        <a:font script="Laoo" typeface="DokChampa"/>
+        <a:font script="Sinh" typeface="Iskoola Pota"/>
+        <a:font script="Mong" typeface="Mongolian Baiti"/>
+        <a:font script="Viet" typeface="Times New Roman"/>
+        <a:font script="Uigh" typeface="Microsoft Uighur"/>
+        <a:font script="Geor" typeface="Sylfaen"/>
+      </a:majorFont>
+      <a:minorFont>
+        <a:latin typeface="Calibri" panose="020F0502020204030204"/>
+        <a:ea typeface=""/>
+        <a:cs typeface=""/>
+        <a:font script="Jpan" typeface="ＭＳ Ｐゴシック"/>
+        <a:font script="Hang" typeface="맑은 고딕"/>
+        <a:font script="Hans" typeface="宋体"/>
+        <a:font script="Hant" typeface="新細明體"/>
+        <a:font script="Arab" typeface="Arial"/>
+        <a:font script="Hebr" typeface="Arial"/>
+        <a:font script="Thai" typeface="Cordia New"/>
+        <a:font script="Ethi" typeface="Nyala"/>
+        <a:font script="Beng" typeface="Vrinda"/>
+        <a:font script="Gujr" typeface="Shruti"/>
+        <a:font script="Khmr" typeface="DaunPenh"/>
+        <a:font script="Knda" typeface="Tunga"/>
+        <a:font script="Guru" typeface="Raavi"/>
+        <a:font script="Cans" typeface="Euphemia"/>
+        <a:font script="Cher" typeface="Plantagenet Cherokee"/>
+        <a:font script="Yiii" typeface="Microsoft Yi Baiti"/>
+        <a:font script="Tibt" typeface="Microsoft Himalaya"/>
+        <a:font script="Thaa" typeface="MV Boli"/>
+        <a:font script="Deva" typeface="Mangal"/>
+        <a:font script="Telu" typeface="Gautami"/>
+        <a:font script="Taml" typeface="Latha"/>
+        <a:font script="Syrc" typeface="Estrangelo Edessa"/>
+        <a:font script="Orya" typeface="Kalinga"/>
+        <a:font script="Mlym" typeface="Kartika"/>
+        <a:font script="Laoo" typeface="DokChampa"/>
+        <a:font script="Sinh" typeface="Iskoola Pota"/>
+        <a:font script="Mong" typeface="Mongolian Baiti"/>
+        <a:font script="Viet" typeface="Arial"/>
+        <a:font script="Uigh" typeface="Microsoft Uighur"/>
+        <a:font script="Geor" typeface="Sylfaen"/>
+      </a:minorFont>
+    </a:fontScheme>
+    <a:fmtScheme name="Office">
+      <a:fillStyleLst>
+        <a:solidFill>
+          <a:schemeClr val="phClr"/>
+        </a:solidFill>
+        <a:gradFill rotWithShape="1">
+          <a:gsLst>
+            <a:gs pos="0">
+              <a:schemeClr val="phClr">
+                <a:lumMod val="110000"/>
+                <a:satMod val="105000"/>
+                <a:tint val="67000"/>
+              </a:schemeClr>
+            </a:gs>
+            <a:gs pos="50000">
+              <a:schemeClr val="phClr">
+                <a:lumMod val="105000"/>
+                <a:satMod val="103000"/>
+                <a:tint val="73000"/>
+              </a:schemeClr>
+            </a:gs>
+            <a:gs pos="100000">
+              <a:schemeClr val="phClr">
+                <a:lumMod val="105000"/>
+                <a:satMod val="109000"/>
+                <a:tint val="81000"/>
+              </a:schemeClr>
+            </a:gs>
+          </a:gsLst>
+          <a:lin ang="5400000" scaled="0"/>
+        </a:gradFill>
+        <a:gradFill rotWithShape="1">
+          <a:gsLst>
+            <a:gs pos="0">
+              <a:schemeClr val="phClr">
+                <a:satMod val="103000"/>
+                <a:lumMod val="102000"/>
+                <a:tint val="94000"/>
+              </a:schemeClr>
+            </a:gs>
+            <a:gs pos="50000">
+              <a:schemeClr val="phClr">
+                <a:satMod val="110000"/>
+                <a:lumMod val="100000"/>
+                <a:shade val="100000"/>
+              </a:schemeClr>
+            </a:gs>
+            <a:gs pos="100000">
+              <a:schemeClr val="phClr">
+                <a:lumMod val="99000"/>
+                <a:satMod val="120000"/>
+                <a:shade val="78000"/>
+              </a:schemeClr>
+            </a:gs>
+          </a:gsLst>
+          <a:lin ang="5400000" scaled="0"/>
+        </a:gradFill>
+      </a:fillStyleLst>
+      <a:lnStyleLst>
+        <a:ln w="6350" cap="flat" cmpd="sng" algn="ctr">
+          <a:solidFill>
+            <a:schemeClr val="phClr"/>
+          </a:solidFill>
+          <a:prstDash val="solid"/>
+          <a:miter lim="800000"/>
+        </a:ln>
+        <a:ln w="12700" cap="flat" cmpd="sng" algn="ctr">
+          <a:solidFill>
+            <a:schemeClr val="phClr"/>
+          </a:solidFill>
+          <a:prstDash val="solid"/>
+          <a:miter lim="800000"/>
+        </a:ln>
+        <a:ln w="19050" cap="flat" cmpd="sng" algn="ctr">
+          <a:solidFill>
+            <a:schemeClr val="phClr"/>
+          </a:solidFill>
+          <a:prstDash val="solid"/>
+          <a:miter lim="800000"/>
+        </a:ln>
+      </a:lnStyleLst>
+      <a:effectStyleLst>
+        <a:effectStyle>
+          <a:effectLst/>
+        </a:effectStyle>
+        <a:effectStyle>
+          <a:effectLst/>
+        </a:effectStyle>
+        <a:effectStyle>
+          <a:effectLst>
+            <a:outerShdw blurRad="57150" dist="19050" dir="5400000" algn="ctr" rotWithShape="0">
+              <a:srgbClr val="000000">
+                <a:alpha val="63000"/>
+              </a:srgbClr>
+            </a:outerShdw>
+          </a:effectLst>
+        </a:effectStyle>
+      </a:effectStyleLst>
+      <a:bgFillStyleLst>
+        <a:solidFill>
+          <a:schemeClr val="phClr"/>
+        </a:solidFill>
+        <a:solidFill>
+          <a:schemeClr val="phClr">
+            <a:tint val="95000"/>
+            <a:satMod val="170000"/>
+          </a:schemeClr>
+        </a:solidFill>
+        <a:gradFill rotWithShape="1">
+          <a:gsLst>
+            <a:gs pos="0">
+              <a:schemeClr val="phClr">
+                <a:tint val="93000"/>
+                <a:satMod val="150000"/>
+                <a:shade val="98000"/>
+                <a:lumMod val="102000"/>
+              </a:schemeClr>
+            </a:gs>
+            <a:gs pos="50000">
+              <a:schemeClr val="phClr">
+                <a:tint val="98000"/>
+                <a:satMod val="130000"/>
+                <a:shade val="90000"/>
+                <a:lumMod val="103000"/>
+              </a:schemeClr>
+            </a:gs>
+            <a:gs pos="100000">
+              <a:schemeClr val="phClr">
+                <a:shade val="63000"/>
+                <a:satMod val="120000"/>
+              </a:schemeClr>
+            </a:gs>
+          </a:gsLst>
+          <a:lin ang="5400000" scaled="0"/>
+        </a:gradFill>
+      </a:bgFillStyleLst>
+    </a:fmtScheme>
+  </a:themeElements>
+  <a:objectDefaults/>
+  <a:extraClrSchemeLst/>
+  <a:extLst>
+    <a:ext uri="{05A4C25C-085E-4340-85A3-A5531E510DB2}">
+      <thm15:themeFamily xmlns:thm15="http://schemas.microsoft.com/office/thememl/2012/main" name="Office Theme" id="{62F939B6-93AF-4DB8-9C6B-D6C7DFDC589F}" vid="{4A3C46E8-61CC-4603-A589-7422A47A8E4A}"/>
+    </a:ext>
+  </a:extLst>
+</a:theme>
 </file>
</xml_diff>